<commit_message>
slides: multiple inheritance slides updated
</commit_message>
<xml_diff>
--- a/slides/multiple_inheritance.pptx
+++ b/slides/multiple_inheritance.pptx
@@ -5,19 +5,22 @@
     <p:sldMasterId id="2147484294" r:id="rId1"/>
   </p:sldMasterIdLst>
   <p:notesMasterIdLst>
-    <p:notesMasterId r:id="rId12"/>
+    <p:notesMasterId r:id="rId15"/>
   </p:notesMasterIdLst>
   <p:sldIdLst>
     <p:sldId id="256" r:id="rId2"/>
     <p:sldId id="257" r:id="rId3"/>
-    <p:sldId id="258" r:id="rId4"/>
-    <p:sldId id="260" r:id="rId5"/>
-    <p:sldId id="261" r:id="rId6"/>
-    <p:sldId id="262" r:id="rId7"/>
-    <p:sldId id="263" r:id="rId8"/>
-    <p:sldId id="264" r:id="rId9"/>
-    <p:sldId id="265" r:id="rId10"/>
-    <p:sldId id="266" r:id="rId11"/>
+    <p:sldId id="268" r:id="rId4"/>
+    <p:sldId id="269" r:id="rId5"/>
+    <p:sldId id="270" r:id="rId6"/>
+    <p:sldId id="271" r:id="rId7"/>
+    <p:sldId id="272" r:id="rId8"/>
+    <p:sldId id="258" r:id="rId9"/>
+    <p:sldId id="261" r:id="rId10"/>
+    <p:sldId id="262" r:id="rId11"/>
+    <p:sldId id="263" r:id="rId12"/>
+    <p:sldId id="273" r:id="rId13"/>
+    <p:sldId id="267" r:id="rId14"/>
   </p:sldIdLst>
   <p:sldSz cx="12192000" cy="6858000"/>
   <p:notesSz cx="6858000" cy="9144000"/>
@@ -206,7 +209,7 @@
           <a:p>
             <a:fld id="{A4372395-6DCD-BB43-9E60-B0AAE1B7F062}" type="datetimeFigureOut">
               <a:rPr lang="en-US" smtClean="0"/>
-              <a:t>5/7/21</a:t>
+              <a:t>5/11/21</a:t>
             </a:fld>
             <a:endParaRPr lang="en-US"/>
           </a:p>
@@ -519,6 +522,117 @@
           <a:p>
             <a:r>
               <a:rPr lang="en-US" dirty="0"/>
+              <a:t>This is in the example codes under examples/</a:t>
+            </a:r>
+            <a:r>
+              <a:rPr lang="en-US" dirty="0" err="1"/>
+              <a:t>mypkg</a:t>
+            </a:r>
+            <a:r>
+              <a:rPr lang="en-US" dirty="0"/>
+              <a:t>/</a:t>
+            </a:r>
+            <a:r>
+              <a:rPr lang="en-US" dirty="0" err="1"/>
+              <a:t>mathlib</a:t>
+            </a:r>
+            <a:r>
+              <a:rPr lang="en-US" dirty="0"/>
+              <a:t>/</a:t>
+            </a:r>
+            <a:r>
+              <a:rPr lang="en-US" dirty="0" err="1"/>
+              <a:t>exposinusoid.py</a:t>
+            </a:r>
+            <a:r>
+              <a:rPr lang="en-US" dirty="0"/>
+              <a:t> </a:t>
+            </a:r>
+          </a:p>
+        </p:txBody>
+      </p:sp>
+      <p:sp>
+        <p:nvSpPr>
+          <p:cNvPr id="4" name="Slide Number Placeholder 3"/>
+          <p:cNvSpPr>
+            <a:spLocks noGrp="1"/>
+          </p:cNvSpPr>
+          <p:nvPr>
+            <p:ph type="sldNum" sz="quarter" idx="5"/>
+          </p:nvPr>
+        </p:nvSpPr>
+        <p:spPr/>
+        <p:txBody>
+          <a:bodyPr/>
+          <a:lstStyle/>
+          <a:p>
+            <a:fld id="{E1CCCE54-4239-094F-97FA-D0CB5A5C70A2}" type="slidenum">
+              <a:rPr lang="en-US" smtClean="0"/>
+              <a:t>8</a:t>
+            </a:fld>
+            <a:endParaRPr lang="en-US"/>
+          </a:p>
+        </p:txBody>
+      </p:sp>
+    </p:spTree>
+    <p:extLst>
+      <p:ext uri="{BB962C8B-B14F-4D97-AF65-F5344CB8AC3E}">
+        <p14:creationId xmlns:p14="http://schemas.microsoft.com/office/powerpoint/2010/main" val="2012151414"/>
+      </p:ext>
+    </p:extLst>
+  </p:cSld>
+  <p:clrMapOvr>
+    <a:masterClrMapping/>
+  </p:clrMapOvr>
+</p:notes>
+</file>
+
+<file path=ppt/notesSlides/notesSlide2.xml><?xml version="1.0" encoding="utf-8"?>
+<p:notes xmlns:a="http://schemas.openxmlformats.org/drawingml/2006/main" xmlns:r="http://schemas.openxmlformats.org/officeDocument/2006/relationships" xmlns:p="http://schemas.openxmlformats.org/presentationml/2006/main">
+  <p:cSld>
+    <p:spTree>
+      <p:nvGrpSpPr>
+        <p:cNvPr id="1" name=""/>
+        <p:cNvGrpSpPr/>
+        <p:nvPr/>
+      </p:nvGrpSpPr>
+      <p:grpSpPr>
+        <a:xfrm>
+          <a:off x="0" y="0"/>
+          <a:ext cx="0" cy="0"/>
+          <a:chOff x="0" y="0"/>
+          <a:chExt cx="0" cy="0"/>
+        </a:xfrm>
+      </p:grpSpPr>
+      <p:sp>
+        <p:nvSpPr>
+          <p:cNvPr id="2" name="Slide Image Placeholder 1"/>
+          <p:cNvSpPr>
+            <a:spLocks noGrp="1" noRot="1" noChangeAspect="1"/>
+          </p:cNvSpPr>
+          <p:nvPr>
+            <p:ph type="sldImg"/>
+          </p:nvPr>
+        </p:nvSpPr>
+        <p:spPr/>
+      </p:sp>
+      <p:sp>
+        <p:nvSpPr>
+          <p:cNvPr id="3" name="Notes Placeholder 2"/>
+          <p:cNvSpPr>
+            <a:spLocks noGrp="1"/>
+          </p:cNvSpPr>
+          <p:nvPr>
+            <p:ph type="body" idx="1"/>
+          </p:nvPr>
+        </p:nvSpPr>
+        <p:spPr/>
+        <p:txBody>
+          <a:bodyPr/>
+          <a:lstStyle/>
+          <a:p>
+            <a:r>
+              <a:rPr lang="en-US" dirty="0"/>
               <a:t>Other</a:t>
             </a:r>
             <a:r>
@@ -546,7 +660,7 @@
           <a:p>
             <a:fld id="{E1CCCE54-4239-094F-97FA-D0CB5A5C70A2}" type="slidenum">
               <a:rPr lang="en-US" smtClean="0"/>
-              <a:t>5</a:t>
+              <a:t>9</a:t>
             </a:fld>
             <a:endParaRPr lang="en-US"/>
           </a:p>
@@ -556,6 +670,174 @@
     <p:extLst>
       <p:ext uri="{BB962C8B-B14F-4D97-AF65-F5344CB8AC3E}">
         <p14:creationId xmlns:p14="http://schemas.microsoft.com/office/powerpoint/2010/main" val="1193435843"/>
+      </p:ext>
+    </p:extLst>
+  </p:cSld>
+  <p:clrMapOvr>
+    <a:masterClrMapping/>
+  </p:clrMapOvr>
+</p:notes>
+</file>
+
+<file path=ppt/notesSlides/notesSlide3.xml><?xml version="1.0" encoding="utf-8"?>
+<p:notes xmlns:a="http://schemas.openxmlformats.org/drawingml/2006/main" xmlns:r="http://schemas.openxmlformats.org/officeDocument/2006/relationships" xmlns:p="http://schemas.openxmlformats.org/presentationml/2006/main">
+  <p:cSld>
+    <p:spTree>
+      <p:nvGrpSpPr>
+        <p:cNvPr id="1" name=""/>
+        <p:cNvGrpSpPr/>
+        <p:nvPr/>
+      </p:nvGrpSpPr>
+      <p:grpSpPr>
+        <a:xfrm>
+          <a:off x="0" y="0"/>
+          <a:ext cx="0" cy="0"/>
+          <a:chOff x="0" y="0"/>
+          <a:chExt cx="0" cy="0"/>
+        </a:xfrm>
+      </p:grpSpPr>
+      <p:sp>
+        <p:nvSpPr>
+          <p:cNvPr id="2" name="Slide Image Placeholder 1"/>
+          <p:cNvSpPr>
+            <a:spLocks noGrp="1" noRot="1" noChangeAspect="1"/>
+          </p:cNvSpPr>
+          <p:nvPr>
+            <p:ph type="sldImg"/>
+          </p:nvPr>
+        </p:nvSpPr>
+        <p:spPr/>
+      </p:sp>
+      <p:sp>
+        <p:nvSpPr>
+          <p:cNvPr id="3" name="Notes Placeholder 2"/>
+          <p:cNvSpPr>
+            <a:spLocks noGrp="1"/>
+          </p:cNvSpPr>
+          <p:nvPr>
+            <p:ph type="body" idx="1"/>
+          </p:nvPr>
+        </p:nvSpPr>
+        <p:spPr/>
+        <p:txBody>
+          <a:bodyPr/>
+          <a:lstStyle/>
+          <a:p>
+            <a:endParaRPr lang="en-US" dirty="0"/>
+          </a:p>
+        </p:txBody>
+      </p:sp>
+      <p:sp>
+        <p:nvSpPr>
+          <p:cNvPr id="4" name="Slide Number Placeholder 3"/>
+          <p:cNvSpPr>
+            <a:spLocks noGrp="1"/>
+          </p:cNvSpPr>
+          <p:nvPr>
+            <p:ph type="sldNum" sz="quarter" idx="5"/>
+          </p:nvPr>
+        </p:nvSpPr>
+        <p:spPr/>
+        <p:txBody>
+          <a:bodyPr/>
+          <a:lstStyle/>
+          <a:p>
+            <a:fld id="{E1CCCE54-4239-094F-97FA-D0CB5A5C70A2}" type="slidenum">
+              <a:rPr lang="en-US" smtClean="0"/>
+              <a:t>12</a:t>
+            </a:fld>
+            <a:endParaRPr lang="en-US"/>
+          </a:p>
+        </p:txBody>
+      </p:sp>
+    </p:spTree>
+    <p:extLst>
+      <p:ext uri="{BB962C8B-B14F-4D97-AF65-F5344CB8AC3E}">
+        <p14:creationId xmlns:p14="http://schemas.microsoft.com/office/powerpoint/2010/main" val="4076174899"/>
+      </p:ext>
+    </p:extLst>
+  </p:cSld>
+  <p:clrMapOvr>
+    <a:masterClrMapping/>
+  </p:clrMapOvr>
+</p:notes>
+</file>
+
+<file path=ppt/notesSlides/notesSlide4.xml><?xml version="1.0" encoding="utf-8"?>
+<p:notes xmlns:a="http://schemas.openxmlformats.org/drawingml/2006/main" xmlns:r="http://schemas.openxmlformats.org/officeDocument/2006/relationships" xmlns:p="http://schemas.openxmlformats.org/presentationml/2006/main">
+  <p:cSld>
+    <p:spTree>
+      <p:nvGrpSpPr>
+        <p:cNvPr id="1" name=""/>
+        <p:cNvGrpSpPr/>
+        <p:nvPr/>
+      </p:nvGrpSpPr>
+      <p:grpSpPr>
+        <a:xfrm>
+          <a:off x="0" y="0"/>
+          <a:ext cx="0" cy="0"/>
+          <a:chOff x="0" y="0"/>
+          <a:chExt cx="0" cy="0"/>
+        </a:xfrm>
+      </p:grpSpPr>
+      <p:sp>
+        <p:nvSpPr>
+          <p:cNvPr id="2" name="Slide Image Placeholder 1"/>
+          <p:cNvSpPr>
+            <a:spLocks noGrp="1" noRot="1" noChangeAspect="1"/>
+          </p:cNvSpPr>
+          <p:nvPr>
+            <p:ph type="sldImg"/>
+          </p:nvPr>
+        </p:nvSpPr>
+        <p:spPr/>
+      </p:sp>
+      <p:sp>
+        <p:nvSpPr>
+          <p:cNvPr id="3" name="Notes Placeholder 2"/>
+          <p:cNvSpPr>
+            <a:spLocks noGrp="1"/>
+          </p:cNvSpPr>
+          <p:nvPr>
+            <p:ph type="body" idx="1"/>
+          </p:nvPr>
+        </p:nvSpPr>
+        <p:spPr/>
+        <p:txBody>
+          <a:bodyPr/>
+          <a:lstStyle/>
+          <a:p>
+            <a:endParaRPr lang="en-US" dirty="0"/>
+          </a:p>
+        </p:txBody>
+      </p:sp>
+      <p:sp>
+        <p:nvSpPr>
+          <p:cNvPr id="4" name="Slide Number Placeholder 3"/>
+          <p:cNvSpPr>
+            <a:spLocks noGrp="1"/>
+          </p:cNvSpPr>
+          <p:nvPr>
+            <p:ph type="sldNum" sz="quarter" idx="5"/>
+          </p:nvPr>
+        </p:nvSpPr>
+        <p:spPr/>
+        <p:txBody>
+          <a:bodyPr/>
+          <a:lstStyle/>
+          <a:p>
+            <a:fld id="{E1CCCE54-4239-094F-97FA-D0CB5A5C70A2}" type="slidenum">
+              <a:rPr lang="en-US" smtClean="0"/>
+              <a:t>13</a:t>
+            </a:fld>
+            <a:endParaRPr lang="en-US"/>
+          </a:p>
+        </p:txBody>
+      </p:sp>
+    </p:spTree>
+    <p:extLst>
+      <p:ext uri="{BB962C8B-B14F-4D97-AF65-F5344CB8AC3E}">
+        <p14:creationId xmlns:p14="http://schemas.microsoft.com/office/powerpoint/2010/main" val="2736247420"/>
       </p:ext>
     </p:extLst>
   </p:cSld>
@@ -841,7 +1123,7 @@
           <a:p>
             <a:fld id="{51673806-0BCD-1F42-BAA8-2011034B3C6A}" type="datetimeFigureOut">
               <a:rPr lang="en-US" smtClean="0"/>
-              <a:t>5/7/21</a:t>
+              <a:t>5/11/21</a:t>
             </a:fld>
             <a:endParaRPr lang="en-US"/>
           </a:p>
@@ -1255,7 +1537,7 @@
           <a:p>
             <a:fld id="{51673806-0BCD-1F42-BAA8-2011034B3C6A}" type="datetimeFigureOut">
               <a:rPr lang="en-US" smtClean="0"/>
-              <a:t>5/7/21</a:t>
+              <a:t>5/11/21</a:t>
             </a:fld>
             <a:endParaRPr lang="en-US"/>
           </a:p>
@@ -1586,7 +1868,7 @@
           <a:p>
             <a:fld id="{51673806-0BCD-1F42-BAA8-2011034B3C6A}" type="datetimeFigureOut">
               <a:rPr lang="en-US" smtClean="0"/>
-              <a:t>5/7/21</a:t>
+              <a:t>5/11/21</a:t>
             </a:fld>
             <a:endParaRPr lang="en-US"/>
           </a:p>
@@ -1986,7 +2268,7 @@
           <a:p>
             <a:fld id="{51673806-0BCD-1F42-BAA8-2011034B3C6A}" type="datetimeFigureOut">
               <a:rPr lang="en-US" smtClean="0"/>
-              <a:t>5/7/21</a:t>
+              <a:t>5/11/21</a:t>
             </a:fld>
             <a:endParaRPr lang="en-US"/>
           </a:p>
@@ -2549,7 +2831,7 @@
           <a:p>
             <a:fld id="{51673806-0BCD-1F42-BAA8-2011034B3C6A}" type="datetimeFigureOut">
               <a:rPr lang="en-US" smtClean="0"/>
-              <a:t>5/7/21</a:t>
+              <a:t>5/11/21</a:t>
             </a:fld>
             <a:endParaRPr lang="en-US"/>
           </a:p>
@@ -3225,7 +3507,7 @@
           <a:p>
             <a:fld id="{51673806-0BCD-1F42-BAA8-2011034B3C6A}" type="datetimeFigureOut">
               <a:rPr lang="en-US" smtClean="0"/>
-              <a:t>5/7/21</a:t>
+              <a:t>5/11/21</a:t>
             </a:fld>
             <a:endParaRPr lang="en-US"/>
           </a:p>
@@ -4133,7 +4415,7 @@
           <a:p>
             <a:fld id="{51673806-0BCD-1F42-BAA8-2011034B3C6A}" type="datetimeFigureOut">
               <a:rPr lang="en-US" smtClean="0"/>
-              <a:t>5/7/21</a:t>
+              <a:t>5/11/21</a:t>
             </a:fld>
             <a:endParaRPr lang="en-US"/>
           </a:p>
@@ -4441,7 +4723,7 @@
           <a:p>
             <a:fld id="{51673806-0BCD-1F42-BAA8-2011034B3C6A}" type="datetimeFigureOut">
               <a:rPr lang="en-US" smtClean="0"/>
-              <a:t>5/7/21</a:t>
+              <a:t>5/11/21</a:t>
             </a:fld>
             <a:endParaRPr lang="en-US"/>
           </a:p>
@@ -4700,7 +4982,7 @@
           <a:p>
             <a:fld id="{51673806-0BCD-1F42-BAA8-2011034B3C6A}" type="datetimeFigureOut">
               <a:rPr lang="en-US" smtClean="0"/>
-              <a:t>5/7/21</a:t>
+              <a:t>5/11/21</a:t>
             </a:fld>
             <a:endParaRPr lang="en-US"/>
           </a:p>
@@ -5023,7 +5305,7 @@
           <a:p>
             <a:fld id="{51673806-0BCD-1F42-BAA8-2011034B3C6A}" type="datetimeFigureOut">
               <a:rPr lang="en-US" smtClean="0"/>
-              <a:t>5/7/21</a:t>
+              <a:t>5/11/21</a:t>
             </a:fld>
             <a:endParaRPr lang="en-US"/>
           </a:p>
@@ -5407,7 +5689,7 @@
           <a:p>
             <a:fld id="{51673806-0BCD-1F42-BAA8-2011034B3C6A}" type="datetimeFigureOut">
               <a:rPr lang="en-US" smtClean="0"/>
-              <a:t>5/7/21</a:t>
+              <a:t>5/11/21</a:t>
             </a:fld>
             <a:endParaRPr lang="en-US"/>
           </a:p>
@@ -5783,7 +6065,7 @@
           <a:p>
             <a:fld id="{51673806-0BCD-1F42-BAA8-2011034B3C6A}" type="datetimeFigureOut">
               <a:rPr lang="en-US" smtClean="0"/>
-              <a:t>5/7/21</a:t>
+              <a:t>5/11/21</a:t>
             </a:fld>
             <a:endParaRPr lang="en-US"/>
           </a:p>
@@ -6289,7 +6571,7 @@
           <a:p>
             <a:fld id="{51673806-0BCD-1F42-BAA8-2011034B3C6A}" type="datetimeFigureOut">
               <a:rPr lang="en-US" smtClean="0"/>
-              <a:t>5/7/21</a:t>
+              <a:t>5/11/21</a:t>
             </a:fld>
             <a:endParaRPr lang="en-US"/>
           </a:p>
@@ -6546,7 +6828,7 @@
           <a:p>
             <a:fld id="{51673806-0BCD-1F42-BAA8-2011034B3C6A}" type="datetimeFigureOut">
               <a:rPr lang="en-US" smtClean="0"/>
-              <a:t>5/7/21</a:t>
+              <a:t>5/11/21</a:t>
             </a:fld>
             <a:endParaRPr lang="en-US"/>
           </a:p>
@@ -6704,7 +6986,7 @@
           <a:p>
             <a:fld id="{51673806-0BCD-1F42-BAA8-2011034B3C6A}" type="datetimeFigureOut">
               <a:rPr lang="en-US" smtClean="0"/>
-              <a:t>5/7/21</a:t>
+              <a:t>5/11/21</a:t>
             </a:fld>
             <a:endParaRPr lang="en-US"/>
           </a:p>
@@ -7094,7 +7376,7 @@
           <a:p>
             <a:fld id="{51673806-0BCD-1F42-BAA8-2011034B3C6A}" type="datetimeFigureOut">
               <a:rPr lang="en-US" smtClean="0"/>
-              <a:t>5/7/21</a:t>
+              <a:t>5/11/21</a:t>
             </a:fld>
             <a:endParaRPr lang="en-US"/>
           </a:p>
@@ -7503,7 +7785,7 @@
           <a:p>
             <a:fld id="{51673806-0BCD-1F42-BAA8-2011034B3C6A}" type="datetimeFigureOut">
               <a:rPr lang="en-US" smtClean="0"/>
-              <a:t>5/7/21</a:t>
+              <a:t>5/11/21</a:t>
             </a:fld>
             <a:endParaRPr lang="en-US"/>
           </a:p>
@@ -7749,7 +8031,7 @@
             <a:fld id="{51673806-0BCD-1F42-BAA8-2011034B3C6A}" type="datetimeFigureOut">
               <a:rPr lang="en-US" smtClean="0"/>
               <a:pPr/>
-              <a:t>5/7/21</a:t>
+              <a:t>5/11/21</a:t>
             </a:fld>
             <a:endParaRPr lang="en-US" dirty="0"/>
           </a:p>
@@ -8281,7 +8563,7 @@
           <a:p>
             <a:r>
               <a:rPr lang="en-US" dirty="0"/>
-              <a:t>The Method Resolution Order</a:t>
+              <a:t>The Method Resolution Order in Action </a:t>
             </a:r>
           </a:p>
         </p:txBody>
@@ -8299,7 +8581,7 @@
         <p:spPr>
           <a:xfrm>
             <a:off x="172995" y="2336873"/>
-            <a:ext cx="4868905" cy="4212208"/>
+            <a:ext cx="4831491" cy="4212208"/>
           </a:xfrm>
         </p:spPr>
         <p:txBody>
@@ -8323,135 +8605,22 @@
               <a:tabLst/>
               <a:defRPr/>
             </a:pPr>
-            <a:endParaRPr lang="en-US" i="1" dirty="0"/>
-          </a:p>
-          <a:p>
-            <a:pPr marL="0" marR="0" lvl="0" indent="0" defTabSz="914400" eaLnBrk="1" fontAlgn="auto" latinLnBrk="0" hangingPunct="1">
-              <a:lnSpc>
-                <a:spcPct val="100000"/>
-              </a:lnSpc>
-              <a:spcBef>
-                <a:spcPts val="0"/>
-              </a:spcBef>
-              <a:spcAft>
-                <a:spcPts val="0"/>
-              </a:spcAft>
-              <a:buClrTx/>
-              <a:buSzTx/>
-              <a:buFontTx/>
-              <a:buNone/>
-              <a:tabLst/>
-              <a:defRPr/>
-            </a:pPr>
-            <a:endParaRPr lang="en-US" i="1" dirty="0"/>
-          </a:p>
-          <a:p>
-            <a:pPr marL="0" marR="0" lvl="0" indent="0" defTabSz="914400" eaLnBrk="1" fontAlgn="auto" latinLnBrk="0" hangingPunct="1">
-              <a:lnSpc>
-                <a:spcPct val="100000"/>
-              </a:lnSpc>
-              <a:spcBef>
-                <a:spcPts val="0"/>
-              </a:spcBef>
-              <a:spcAft>
-                <a:spcPts val="0"/>
-              </a:spcAft>
-              <a:buClrTx/>
-              <a:buSzTx/>
-              <a:buFontTx/>
-              <a:buNone/>
-              <a:tabLst/>
-              <a:defRPr/>
-            </a:pPr>
-            <a:endParaRPr lang="en-US" i="1" dirty="0"/>
-          </a:p>
-          <a:p>
-            <a:pPr marL="0" marR="0" lvl="0" indent="0" defTabSz="914400" eaLnBrk="1" fontAlgn="auto" latinLnBrk="0" hangingPunct="1">
-              <a:lnSpc>
-                <a:spcPct val="100000"/>
-              </a:lnSpc>
-              <a:spcBef>
-                <a:spcPts val="0"/>
-              </a:spcBef>
-              <a:spcAft>
-                <a:spcPts val="0"/>
-              </a:spcAft>
-              <a:buClrTx/>
-              <a:buSzTx/>
-              <a:buFontTx/>
-              <a:buNone/>
-              <a:tabLst/>
-              <a:defRPr/>
-            </a:pPr>
             <a:r>
               <a:rPr lang="en-US" dirty="0"/>
-              <a:t>Advice: I prefer to always specify which base class I’m pulling from. </a:t>
-            </a:r>
-          </a:p>
-          <a:p>
-            <a:pPr lvl="1">
-              <a:lnSpc>
-                <a:spcPct val="100000"/>
-              </a:lnSpc>
-              <a:spcBef>
-                <a:spcPts val="0"/>
-              </a:spcBef>
-              <a:defRPr/>
-            </a:pPr>
+              <a:t>Replaced the body of the </a:t>
+            </a:r>
             <a:r>
               <a:rPr lang="en-US" i="1" dirty="0"/>
-              <a:t>super()</a:t>
+              <a:t>__call__</a:t>
             </a:r>
             <a:r>
               <a:rPr lang="en-US" dirty="0"/>
-              <a:t> sacrifices readability </a:t>
-            </a:r>
-          </a:p>
-          <a:p>
-            <a:pPr lvl="1">
-              <a:lnSpc>
-                <a:spcPct val="100000"/>
-              </a:lnSpc>
-              <a:spcBef>
-                <a:spcPts val="0"/>
-              </a:spcBef>
-              <a:defRPr/>
-            </a:pPr>
-            <a:r>
-              <a:rPr lang="en-US" dirty="0"/>
-              <a:t>“Explicit is better than implicit” </a:t>
-            </a:r>
-          </a:p>
-          <a:p>
-            <a:pPr lvl="1">
-              <a:lnSpc>
-                <a:spcPct val="100000"/>
-              </a:lnSpc>
-              <a:spcBef>
-                <a:spcPts val="0"/>
-              </a:spcBef>
-              <a:defRPr/>
-            </a:pPr>
-            <a:r>
-              <a:rPr lang="en-US" dirty="0"/>
-              <a:t>Changing functionality requires changing</a:t>
+              <a:t> function with a simple call to </a:t>
             </a:r>
             <a:r>
               <a:rPr lang="en-US" i="1" dirty="0"/>
-              <a:t> the lines that implement it </a:t>
-            </a:r>
-          </a:p>
-          <a:p>
-            <a:pPr marL="0" indent="0">
-              <a:lnSpc>
-                <a:spcPct val="100000"/>
-              </a:lnSpc>
-              <a:spcBef>
-                <a:spcPts val="0"/>
-              </a:spcBef>
-              <a:buNone/>
-              <a:defRPr/>
-            </a:pPr>
+              <a:t>super</a:t>
+            </a:r>
             <a:endParaRPr lang="en-US" dirty="0"/>
           </a:p>
         </p:txBody>
@@ -8489,7 +8658,611 @@
     </p:spTree>
     <p:extLst>
       <p:ext uri="{BB962C8B-B14F-4D97-AF65-F5344CB8AC3E}">
-        <p14:creationId xmlns:p14="http://schemas.microsoft.com/office/powerpoint/2010/main" val="2056650262"/>
+        <p14:creationId xmlns:p14="http://schemas.microsoft.com/office/powerpoint/2010/main" val="1394449658"/>
+      </p:ext>
+    </p:extLst>
+  </p:cSld>
+  <p:clrMapOvr>
+    <a:masterClrMapping/>
+  </p:clrMapOvr>
+</p:sld>
+</file>
+
+<file path=ppt/slides/slide11.xml><?xml version="1.0" encoding="utf-8"?>
+<p:sld xmlns:a="http://schemas.openxmlformats.org/drawingml/2006/main" xmlns:r="http://schemas.openxmlformats.org/officeDocument/2006/relationships" xmlns:p="http://schemas.openxmlformats.org/presentationml/2006/main">
+  <p:cSld>
+    <p:spTree>
+      <p:nvGrpSpPr>
+        <p:cNvPr id="1" name=""/>
+        <p:cNvGrpSpPr/>
+        <p:nvPr/>
+      </p:nvGrpSpPr>
+      <p:grpSpPr>
+        <a:xfrm>
+          <a:off x="0" y="0"/>
+          <a:ext cx="0" cy="0"/>
+          <a:chOff x="0" y="0"/>
+          <a:chExt cx="0" cy="0"/>
+        </a:xfrm>
+      </p:grpSpPr>
+      <p:sp>
+        <p:nvSpPr>
+          <p:cNvPr id="2" name="Title 1"/>
+          <p:cNvSpPr>
+            <a:spLocks noGrp="1"/>
+          </p:cNvSpPr>
+          <p:nvPr>
+            <p:ph type="title"/>
+          </p:nvPr>
+        </p:nvSpPr>
+        <p:spPr/>
+        <p:txBody>
+          <a:bodyPr/>
+          <a:lstStyle/>
+          <a:p>
+            <a:r>
+              <a:rPr lang="en-US" dirty="0"/>
+              <a:t>The Method Resolution Order in Action </a:t>
+            </a:r>
+          </a:p>
+        </p:txBody>
+      </p:sp>
+      <p:pic>
+        <p:nvPicPr>
+          <p:cNvPr id="5" name="Picture 4"/>
+          <p:cNvPicPr>
+            <a:picLocks noChangeAspect="1"/>
+          </p:cNvPicPr>
+          <p:nvPr/>
+        </p:nvPicPr>
+        <p:blipFill>
+          <a:blip r:embed="rId2">
+            <a:extLst>
+              <a:ext uri="{28A0092B-C50C-407E-A947-70E740481C1C}">
+                <a14:useLocalDpi xmlns:a14="http://schemas.microsoft.com/office/drawing/2010/main" val="0"/>
+              </a:ext>
+            </a:extLst>
+          </a:blip>
+          <a:stretch>
+            <a:fillRect/>
+          </a:stretch>
+        </p:blipFill>
+        <p:spPr>
+          <a:xfrm>
+            <a:off x="5309286" y="2364703"/>
+            <a:ext cx="6516130" cy="4184378"/>
+          </a:xfrm>
+          <a:prstGeom prst="rect">
+            <a:avLst/>
+          </a:prstGeom>
+        </p:spPr>
+      </p:pic>
+      <p:sp>
+        <p:nvSpPr>
+          <p:cNvPr id="7" name="Content Placeholder 2">
+            <a:extLst>
+              <a:ext uri="{FF2B5EF4-FFF2-40B4-BE49-F238E27FC236}">
+                <a16:creationId xmlns:a16="http://schemas.microsoft.com/office/drawing/2014/main" id="{94E22B91-5277-5642-9D4F-2565F577CC10}"/>
+              </a:ext>
+            </a:extLst>
+          </p:cNvPr>
+          <p:cNvSpPr>
+            <a:spLocks noGrp="1"/>
+          </p:cNvSpPr>
+          <p:nvPr>
+            <p:ph idx="1"/>
+          </p:nvPr>
+        </p:nvSpPr>
+        <p:spPr>
+          <a:xfrm>
+            <a:off x="172995" y="2336873"/>
+            <a:ext cx="4913355" cy="4212208"/>
+          </a:xfrm>
+        </p:spPr>
+        <p:txBody>
+          <a:bodyPr/>
+          <a:lstStyle/>
+          <a:p>
+            <a:pPr marL="0" marR="0" lvl="0" indent="0" defTabSz="914400" eaLnBrk="1" fontAlgn="auto" latinLnBrk="0" hangingPunct="1">
+              <a:lnSpc>
+                <a:spcPct val="100000"/>
+              </a:lnSpc>
+              <a:spcBef>
+                <a:spcPts val="0"/>
+              </a:spcBef>
+              <a:spcAft>
+                <a:spcPts val="0"/>
+              </a:spcAft>
+              <a:buClrTx/>
+              <a:buSzTx/>
+              <a:buFontTx/>
+              <a:buNone/>
+              <a:tabLst/>
+              <a:defRPr/>
+            </a:pPr>
+            <a:r>
+              <a:rPr lang="en-US" dirty="0"/>
+              <a:t>Replaced the body of the </a:t>
+            </a:r>
+            <a:r>
+              <a:rPr lang="en-US" i="1" dirty="0"/>
+              <a:t>__call__</a:t>
+            </a:r>
+            <a:r>
+              <a:rPr lang="en-US" dirty="0"/>
+              <a:t> function with a simple call to </a:t>
+            </a:r>
+            <a:r>
+              <a:rPr lang="en-US" i="1" dirty="0"/>
+              <a:t>super</a:t>
+            </a:r>
+            <a:endParaRPr lang="en-US" dirty="0"/>
+          </a:p>
+          <a:p>
+            <a:pPr marL="0" marR="0" lvl="0" indent="0" defTabSz="914400" eaLnBrk="1" fontAlgn="auto" latinLnBrk="0" hangingPunct="1">
+              <a:lnSpc>
+                <a:spcPct val="100000"/>
+              </a:lnSpc>
+              <a:spcBef>
+                <a:spcPts val="0"/>
+              </a:spcBef>
+              <a:spcAft>
+                <a:spcPts val="0"/>
+              </a:spcAft>
+              <a:buClrTx/>
+              <a:buSzTx/>
+              <a:buFontTx/>
+              <a:buNone/>
+              <a:tabLst/>
+              <a:defRPr/>
+            </a:pPr>
+            <a:endParaRPr lang="en-US" dirty="0"/>
+          </a:p>
+          <a:p>
+            <a:pPr marL="0" marR="0" lvl="0" indent="0" defTabSz="914400" eaLnBrk="1" fontAlgn="auto" latinLnBrk="0" hangingPunct="1">
+              <a:lnSpc>
+                <a:spcPct val="100000"/>
+              </a:lnSpc>
+              <a:spcBef>
+                <a:spcPts val="0"/>
+              </a:spcBef>
+              <a:spcAft>
+                <a:spcPts val="0"/>
+              </a:spcAft>
+              <a:buClrTx/>
+              <a:buSzTx/>
+              <a:buFontTx/>
+              <a:buNone/>
+              <a:tabLst/>
+              <a:defRPr/>
+            </a:pPr>
+            <a:r>
+              <a:rPr lang="en-US" dirty="0"/>
+              <a:t>Now it’s only calling </a:t>
+            </a:r>
+            <a:r>
+              <a:rPr lang="en-US" i="1" dirty="0" err="1"/>
+              <a:t>exponential.__call</a:t>
+            </a:r>
+            <a:r>
+              <a:rPr lang="en-US" i="1" dirty="0"/>
+              <a:t>__</a:t>
+            </a:r>
+            <a:r>
+              <a:rPr lang="en-US" dirty="0"/>
+              <a:t> </a:t>
+            </a:r>
+          </a:p>
+          <a:p>
+            <a:pPr marL="0" marR="0" lvl="0" indent="0" defTabSz="914400" eaLnBrk="1" fontAlgn="auto" latinLnBrk="0" hangingPunct="1">
+              <a:lnSpc>
+                <a:spcPct val="100000"/>
+              </a:lnSpc>
+              <a:spcBef>
+                <a:spcPts val="0"/>
+              </a:spcBef>
+              <a:spcAft>
+                <a:spcPts val="0"/>
+              </a:spcAft>
+              <a:buClrTx/>
+              <a:buSzTx/>
+              <a:buFontTx/>
+              <a:buNone/>
+              <a:tabLst/>
+              <a:defRPr/>
+            </a:pPr>
+            <a:endParaRPr lang="en-US" dirty="0"/>
+          </a:p>
+          <a:p>
+            <a:pPr marL="0" marR="0" lvl="0" indent="0" defTabSz="914400" eaLnBrk="1" fontAlgn="auto" latinLnBrk="0" hangingPunct="1">
+              <a:lnSpc>
+                <a:spcPct val="100000"/>
+              </a:lnSpc>
+              <a:spcBef>
+                <a:spcPts val="0"/>
+              </a:spcBef>
+              <a:spcAft>
+                <a:spcPts val="0"/>
+              </a:spcAft>
+              <a:buClrTx/>
+              <a:buSzTx/>
+              <a:buFontTx/>
+              <a:buNone/>
+              <a:tabLst/>
+              <a:defRPr/>
+            </a:pPr>
+            <a:r>
+              <a:rPr lang="en-US" dirty="0"/>
+              <a:t>If </a:t>
+            </a:r>
+            <a:r>
+              <a:rPr lang="en-US" i="1" dirty="0" err="1"/>
+              <a:t>exposinusoid</a:t>
+            </a:r>
+            <a:r>
+              <a:rPr lang="en-US" dirty="0"/>
+              <a:t> inherited from </a:t>
+            </a:r>
+            <a:r>
+              <a:rPr lang="en-US" i="1" dirty="0"/>
+              <a:t>sinusoid</a:t>
+            </a:r>
+            <a:r>
+              <a:rPr lang="en-US" dirty="0"/>
+              <a:t> first, this would find </a:t>
+            </a:r>
+            <a:r>
+              <a:rPr lang="en-US" i="1" dirty="0" err="1"/>
+              <a:t>sinusoid.__call</a:t>
+            </a:r>
+            <a:r>
+              <a:rPr lang="en-US" i="1" dirty="0"/>
+              <a:t>__</a:t>
+            </a:r>
+            <a:r>
+              <a:rPr lang="en-US" dirty="0"/>
+              <a:t> instead </a:t>
+            </a:r>
+          </a:p>
+        </p:txBody>
+      </p:sp>
+    </p:spTree>
+    <p:extLst>
+      <p:ext uri="{BB962C8B-B14F-4D97-AF65-F5344CB8AC3E}">
+        <p14:creationId xmlns:p14="http://schemas.microsoft.com/office/powerpoint/2010/main" val="961050770"/>
+      </p:ext>
+    </p:extLst>
+  </p:cSld>
+  <p:clrMapOvr>
+    <a:masterClrMapping/>
+  </p:clrMapOvr>
+</p:sld>
+</file>
+
+<file path=ppt/slides/slide12.xml><?xml version="1.0" encoding="utf-8"?>
+<p:sld xmlns:a="http://schemas.openxmlformats.org/drawingml/2006/main" xmlns:r="http://schemas.openxmlformats.org/officeDocument/2006/relationships" xmlns:p="http://schemas.openxmlformats.org/presentationml/2006/main">
+  <p:cSld>
+    <p:spTree>
+      <p:nvGrpSpPr>
+        <p:cNvPr id="1" name=""/>
+        <p:cNvGrpSpPr/>
+        <p:nvPr/>
+      </p:nvGrpSpPr>
+      <p:grpSpPr>
+        <a:xfrm>
+          <a:off x="0" y="0"/>
+          <a:ext cx="0" cy="0"/>
+          <a:chOff x="0" y="0"/>
+          <a:chExt cx="0" cy="0"/>
+        </a:xfrm>
+      </p:grpSpPr>
+      <p:sp>
+        <p:nvSpPr>
+          <p:cNvPr id="2" name="Title 1">
+            <a:extLst>
+              <a:ext uri="{FF2B5EF4-FFF2-40B4-BE49-F238E27FC236}">
+                <a16:creationId xmlns:a16="http://schemas.microsoft.com/office/drawing/2014/main" id="{2C1E466C-45DA-C04A-86DD-8675AE1D5972}"/>
+              </a:ext>
+            </a:extLst>
+          </p:cNvPr>
+          <p:cNvSpPr>
+            <a:spLocks noGrp="1"/>
+          </p:cNvSpPr>
+          <p:nvPr>
+            <p:ph type="title"/>
+          </p:nvPr>
+        </p:nvSpPr>
+        <p:spPr/>
+        <p:txBody>
+          <a:bodyPr/>
+          <a:lstStyle/>
+          <a:p>
+            <a:r>
+              <a:rPr lang="en-US" dirty="0"/>
+              <a:t>Footnotes </a:t>
+            </a:r>
+          </a:p>
+        </p:txBody>
+      </p:sp>
+      <p:sp>
+        <p:nvSpPr>
+          <p:cNvPr id="3" name="Content Placeholder 2">
+            <a:extLst>
+              <a:ext uri="{FF2B5EF4-FFF2-40B4-BE49-F238E27FC236}">
+                <a16:creationId xmlns:a16="http://schemas.microsoft.com/office/drawing/2014/main" id="{7C1B2629-18E2-7A47-AF73-ACE9B149D47B}"/>
+              </a:ext>
+            </a:extLst>
+          </p:cNvPr>
+          <p:cNvSpPr>
+            <a:spLocks noGrp="1"/>
+          </p:cNvSpPr>
+          <p:nvPr>
+            <p:ph idx="1"/>
+          </p:nvPr>
+        </p:nvSpPr>
+        <p:spPr>
+          <a:xfrm>
+            <a:off x="680321" y="2336873"/>
+            <a:ext cx="10606804" cy="4263952"/>
+          </a:xfrm>
+        </p:spPr>
+        <p:txBody>
+          <a:bodyPr/>
+          <a:lstStyle/>
+          <a:p>
+            <a:pPr marL="0" indent="0">
+              <a:buNone/>
+            </a:pPr>
+            <a:r>
+              <a:rPr lang="en-US" dirty="0"/>
+              <a:t>In some specific instances, </a:t>
+            </a:r>
+            <a:r>
+              <a:rPr lang="en-US" i="1" dirty="0"/>
+              <a:t>super</a:t>
+            </a:r>
+            <a:r>
+              <a:rPr lang="en-US" dirty="0"/>
+              <a:t> is smart enough to make sure all inherited classes’ </a:t>
+            </a:r>
+            <a:r>
+              <a:rPr lang="en-US" i="1" dirty="0"/>
+              <a:t>__</a:t>
+            </a:r>
+            <a:r>
+              <a:rPr lang="en-US" i="1" dirty="0" err="1"/>
+              <a:t>init</a:t>
+            </a:r>
+            <a:r>
+              <a:rPr lang="en-US" i="1" dirty="0"/>
+              <a:t>__</a:t>
+            </a:r>
+            <a:r>
+              <a:rPr lang="en-US" dirty="0"/>
+              <a:t> functions get called </a:t>
+            </a:r>
+          </a:p>
+          <a:p>
+            <a:pPr lvl="1"/>
+            <a:r>
+              <a:rPr lang="en-US" dirty="0"/>
+              <a:t>Example: “diamond inheritance” (B and C inherit from A, D inherits from B and C) </a:t>
+            </a:r>
+          </a:p>
+          <a:p>
+            <a:pPr marL="0" indent="0">
+              <a:buNone/>
+            </a:pPr>
+            <a:endParaRPr lang="en-US" dirty="0"/>
+          </a:p>
+          <a:p>
+            <a:pPr marL="0" indent="0">
+              <a:buNone/>
+            </a:pPr>
+            <a:endParaRPr lang="en-US" dirty="0"/>
+          </a:p>
+          <a:p>
+            <a:pPr marL="0" indent="0">
+              <a:buNone/>
+            </a:pPr>
+            <a:r>
+              <a:rPr lang="en-US" dirty="0"/>
+              <a:t>“</a:t>
+            </a:r>
+            <a:r>
+              <a:rPr lang="en-US" dirty="0" err="1"/>
+              <a:t>Mixin</a:t>
+            </a:r>
+            <a:r>
+              <a:rPr lang="en-US" dirty="0"/>
+              <a:t>” classes – designed for multiple inheritance </a:t>
+            </a:r>
+          </a:p>
+          <a:p>
+            <a:pPr lvl="1"/>
+            <a:r>
+              <a:rPr lang="en-US" dirty="0"/>
+              <a:t>Generally implement only one function each, then “mix” them by inheriting from multiple </a:t>
+            </a:r>
+          </a:p>
+          <a:p>
+            <a:pPr lvl="1"/>
+            <a:r>
+              <a:rPr lang="en-US" dirty="0"/>
+              <a:t>Conventionally have names ending in -</a:t>
+            </a:r>
+            <a:r>
+              <a:rPr lang="en-US" dirty="0" err="1"/>
+              <a:t>Mixin</a:t>
+            </a:r>
+            <a:r>
+              <a:rPr lang="en-US" dirty="0"/>
+              <a:t> </a:t>
+            </a:r>
+          </a:p>
+          <a:p>
+            <a:pPr marL="0" indent="0">
+              <a:buNone/>
+            </a:pPr>
+            <a:endParaRPr lang="en-US" dirty="0"/>
+          </a:p>
+        </p:txBody>
+      </p:sp>
+    </p:spTree>
+    <p:extLst>
+      <p:ext uri="{BB962C8B-B14F-4D97-AF65-F5344CB8AC3E}">
+        <p14:creationId xmlns:p14="http://schemas.microsoft.com/office/powerpoint/2010/main" val="688085749"/>
+      </p:ext>
+    </p:extLst>
+  </p:cSld>
+  <p:clrMapOvr>
+    <a:masterClrMapping/>
+  </p:clrMapOvr>
+</p:sld>
+</file>
+
+<file path=ppt/slides/slide13.xml><?xml version="1.0" encoding="utf-8"?>
+<p:sld xmlns:a="http://schemas.openxmlformats.org/drawingml/2006/main" xmlns:r="http://schemas.openxmlformats.org/officeDocument/2006/relationships" xmlns:p="http://schemas.openxmlformats.org/presentationml/2006/main">
+  <p:cSld>
+    <p:spTree>
+      <p:nvGrpSpPr>
+        <p:cNvPr id="1" name=""/>
+        <p:cNvGrpSpPr/>
+        <p:nvPr/>
+      </p:nvGrpSpPr>
+      <p:grpSpPr>
+        <a:xfrm>
+          <a:off x="0" y="0"/>
+          <a:ext cx="0" cy="0"/>
+          <a:chOff x="0" y="0"/>
+          <a:chExt cx="0" cy="0"/>
+        </a:xfrm>
+      </p:grpSpPr>
+      <p:sp>
+        <p:nvSpPr>
+          <p:cNvPr id="2" name="Title 1">
+            <a:extLst>
+              <a:ext uri="{FF2B5EF4-FFF2-40B4-BE49-F238E27FC236}">
+                <a16:creationId xmlns:a16="http://schemas.microsoft.com/office/drawing/2014/main" id="{2C1E466C-45DA-C04A-86DD-8675AE1D5972}"/>
+              </a:ext>
+            </a:extLst>
+          </p:cNvPr>
+          <p:cNvSpPr>
+            <a:spLocks noGrp="1"/>
+          </p:cNvSpPr>
+          <p:nvPr>
+            <p:ph type="title"/>
+          </p:nvPr>
+        </p:nvSpPr>
+        <p:spPr/>
+        <p:txBody>
+          <a:bodyPr/>
+          <a:lstStyle/>
+          <a:p>
+            <a:r>
+              <a:rPr lang="en-US" dirty="0"/>
+              <a:t>Footnotes </a:t>
+            </a:r>
+          </a:p>
+        </p:txBody>
+      </p:sp>
+      <p:sp>
+        <p:nvSpPr>
+          <p:cNvPr id="3" name="Content Placeholder 2">
+            <a:extLst>
+              <a:ext uri="{FF2B5EF4-FFF2-40B4-BE49-F238E27FC236}">
+                <a16:creationId xmlns:a16="http://schemas.microsoft.com/office/drawing/2014/main" id="{7C1B2629-18E2-7A47-AF73-ACE9B149D47B}"/>
+              </a:ext>
+            </a:extLst>
+          </p:cNvPr>
+          <p:cNvSpPr>
+            <a:spLocks noGrp="1"/>
+          </p:cNvSpPr>
+          <p:nvPr>
+            <p:ph idx="1"/>
+          </p:nvPr>
+        </p:nvSpPr>
+        <p:spPr>
+          <a:xfrm>
+            <a:off x="680321" y="2336873"/>
+            <a:ext cx="10606804" cy="4263952"/>
+          </a:xfrm>
+        </p:spPr>
+        <p:txBody>
+          <a:bodyPr/>
+          <a:lstStyle/>
+          <a:p>
+            <a:pPr marL="0" indent="0">
+              <a:buNone/>
+            </a:pPr>
+            <a:r>
+              <a:rPr lang="en-US" dirty="0"/>
+              <a:t>Developers often argue that multiple inheritance is bad practice</a:t>
+            </a:r>
+          </a:p>
+          <a:p>
+            <a:pPr lvl="1"/>
+            <a:r>
+              <a:rPr lang="en-US" dirty="0"/>
+              <a:t>This really only means it should be used sparingly, when no other options are available </a:t>
+            </a:r>
+          </a:p>
+          <a:p>
+            <a:pPr marL="0" indent="0">
+              <a:buNone/>
+            </a:pPr>
+            <a:endParaRPr lang="en-US" dirty="0"/>
+          </a:p>
+          <a:p>
+            <a:pPr marL="0" indent="0">
+              <a:buNone/>
+            </a:pPr>
+            <a:endParaRPr lang="en-US" dirty="0"/>
+          </a:p>
+          <a:p>
+            <a:pPr marL="0" indent="0">
+              <a:buNone/>
+            </a:pPr>
+            <a:r>
+              <a:rPr lang="en-US" dirty="0"/>
+              <a:t>Advice: Don’t be afraid to use it when it offers a concise, readable solution </a:t>
+            </a:r>
+          </a:p>
+          <a:p>
+            <a:pPr lvl="1"/>
+            <a:r>
+              <a:rPr lang="en-US" dirty="0"/>
+              <a:t>…but only if the single inheritance version is noticeably less so </a:t>
+            </a:r>
+          </a:p>
+          <a:p>
+            <a:pPr lvl="1"/>
+            <a:r>
+              <a:rPr lang="en-US" dirty="0"/>
+              <a:t>Avoid </a:t>
+            </a:r>
+            <a:r>
+              <a:rPr lang="en-US" i="1" dirty="0"/>
+              <a:t>super</a:t>
+            </a:r>
+            <a:r>
+              <a:rPr lang="en-US" dirty="0"/>
+              <a:t> – it sacrifices readability. “Explicit is better than implicit.” </a:t>
+            </a:r>
+          </a:p>
+          <a:p>
+            <a:pPr lvl="1"/>
+            <a:r>
+              <a:rPr lang="en-US" dirty="0"/>
+              <a:t>Changing functionality requires changing the lines that implement that functionality </a:t>
+            </a:r>
+          </a:p>
+        </p:txBody>
+      </p:sp>
+    </p:spTree>
+    <p:extLst>
+      <p:ext uri="{BB962C8B-B14F-4D97-AF65-F5344CB8AC3E}">
+        <p14:creationId xmlns:p14="http://schemas.microsoft.com/office/powerpoint/2010/main" val="4063987313"/>
       </p:ext>
     </p:extLst>
   </p:cSld>
@@ -8548,9 +9321,16 @@
             <p:ph idx="1"/>
           </p:nvPr>
         </p:nvSpPr>
-        <p:spPr/>
-        <p:txBody>
-          <a:bodyPr/>
+        <p:spPr>
+          <a:xfrm>
+            <a:off x="680321" y="2336873"/>
+            <a:ext cx="9613861" cy="4132166"/>
+          </a:xfrm>
+        </p:spPr>
+        <p:txBody>
+          <a:bodyPr>
+            <a:normAutofit/>
+          </a:bodyPr>
           <a:lstStyle/>
           <a:p>
             <a:pPr marL="0" indent="0">
@@ -8571,56 +9351,36 @@
             <a:pPr marL="0" indent="0">
               <a:buNone/>
             </a:pPr>
+            <a:endParaRPr lang="en-US" dirty="0"/>
+          </a:p>
+          <a:p>
+            <a:pPr marL="0" indent="0">
+              <a:buNone/>
+            </a:pPr>
             <a:r>
               <a:rPr lang="en-US" dirty="0"/>
-              <a:t>Disclaimer: Multiple inheritance is often regarded as poor practice. </a:t>
-            </a:r>
-          </a:p>
-          <a:p>
-            <a:pPr marL="0" indent="0">
-              <a:buNone/>
-            </a:pPr>
+              <a:t>Objectives </a:t>
+            </a:r>
+          </a:p>
+          <a:p>
+            <a:pPr lvl="1"/>
             <a:r>
               <a:rPr lang="en-US" dirty="0"/>
-              <a:t>Advice: Use it only when single inheritance isn’t an option. </a:t>
-            </a:r>
-            <a:endParaRPr lang="en-US" i="1" dirty="0"/>
-          </a:p>
-          <a:p>
-            <a:pPr marL="0" indent="0">
-              <a:buNone/>
-            </a:pPr>
-            <a:endParaRPr lang="en-US" dirty="0"/>
-          </a:p>
-          <a:p>
-            <a:pPr marL="0" indent="0">
-              <a:buNone/>
-            </a:pPr>
+              <a:t>The basic syntax </a:t>
+            </a:r>
+          </a:p>
+          <a:p>
+            <a:pPr lvl="1"/>
             <a:r>
               <a:rPr lang="en-US" dirty="0"/>
-              <a:t>Examples </a:t>
+              <a:t>The method resolution order </a:t>
             </a:r>
           </a:p>
           <a:p>
             <a:pPr lvl="1"/>
             <a:r>
               <a:rPr lang="en-US" dirty="0"/>
-              <a:t>Making a piece-wise callable object out of other callable objects </a:t>
-            </a:r>
-          </a:p>
-          <a:p>
-            <a:pPr lvl="1"/>
-            <a:r>
-              <a:rPr lang="en-US" dirty="0"/>
-              <a:t>“</a:t>
-            </a:r>
-            <a:r>
-              <a:rPr lang="en-US" dirty="0" err="1"/>
-              <a:t>gradstudent</a:t>
-            </a:r>
-            <a:r>
-              <a:rPr lang="en-US" dirty="0"/>
-              <a:t>” object out of the “student” and “professor” classes from last session </a:t>
+              <a:t>A simple example: A piece-wise function </a:t>
             </a:r>
           </a:p>
         </p:txBody>
@@ -8657,7 +9417,13 @@
       </p:grpSpPr>
       <p:sp>
         <p:nvSpPr>
-          <p:cNvPr id="2" name="Title 1"/>
+          <p:cNvPr id="2" name="Title 1">
+            <a:extLst>
+              <a:ext uri="{FF2B5EF4-FFF2-40B4-BE49-F238E27FC236}">
+                <a16:creationId xmlns:a16="http://schemas.microsoft.com/office/drawing/2014/main" id="{57793361-385D-7A47-BBFB-96F49E1F4CA9}"/>
+              </a:ext>
+            </a:extLst>
+          </p:cNvPr>
           <p:cNvSpPr>
             <a:spLocks noGrp="1"/>
           </p:cNvSpPr>
@@ -8672,14 +9438,20 @@
           <a:p>
             <a:r>
               <a:rPr lang="en-US" dirty="0"/>
-              <a:t>The Basic Syntax</a:t>
-            </a:r>
-          </a:p>
-        </p:txBody>
-      </p:sp>
-      <p:sp>
-        <p:nvSpPr>
-          <p:cNvPr id="3" name="Content Placeholder 2"/>
+              <a:t>The Basic Syntax </a:t>
+            </a:r>
+          </a:p>
+        </p:txBody>
+      </p:sp>
+      <p:sp>
+        <p:nvSpPr>
+          <p:cNvPr id="3" name="Content Placeholder 2">
+            <a:extLst>
+              <a:ext uri="{FF2B5EF4-FFF2-40B4-BE49-F238E27FC236}">
+                <a16:creationId xmlns:a16="http://schemas.microsoft.com/office/drawing/2014/main" id="{8F904C63-297B-354B-8CF2-3329FFB10BEB}"/>
+              </a:ext>
+            </a:extLst>
+          </p:cNvPr>
           <p:cNvSpPr>
             <a:spLocks noGrp="1"/>
           </p:cNvSpPr>
@@ -8689,177 +9461,60 @@
         </p:nvSpPr>
         <p:spPr>
           <a:xfrm>
-            <a:off x="148280" y="2183714"/>
-            <a:ext cx="4744996" cy="4368799"/>
+            <a:off x="286603" y="2336872"/>
+            <a:ext cx="5049673" cy="4063927"/>
           </a:xfrm>
         </p:spPr>
         <p:txBody>
           <a:bodyPr/>
           <a:lstStyle/>
           <a:p>
-            <a:pPr marL="0" marR="0" lvl="0" indent="0" defTabSz="914400" eaLnBrk="1" fontAlgn="auto" latinLnBrk="0" hangingPunct="1">
-              <a:lnSpc>
-                <a:spcPct val="100000"/>
-              </a:lnSpc>
-              <a:spcBef>
-                <a:spcPts val="0"/>
-              </a:spcBef>
-              <a:spcAft>
-                <a:spcPts val="0"/>
-              </a:spcAft>
-              <a:buClrTx/>
-              <a:buSzTx/>
-              <a:buFontTx/>
-              <a:buNone/>
-              <a:tabLst/>
-              <a:defRPr/>
+            <a:pPr marL="0" indent="0">
+              <a:buNone/>
             </a:pPr>
             <a:r>
               <a:rPr lang="en-US" dirty="0"/>
-              <a:t>Where previously you’d put the name of the one base class you want to inherit from, add all additional base classes. </a:t>
-            </a:r>
-          </a:p>
-          <a:p>
-            <a:pPr marL="0" marR="0" lvl="0" indent="0" defTabSz="914400" eaLnBrk="1" fontAlgn="auto" latinLnBrk="0" hangingPunct="1">
-              <a:lnSpc>
-                <a:spcPct val="100000"/>
-              </a:lnSpc>
-              <a:spcBef>
-                <a:spcPts val="0"/>
-              </a:spcBef>
-              <a:spcAft>
-                <a:spcPts val="0"/>
-              </a:spcAft>
-              <a:buClrTx/>
-              <a:buSzTx/>
-              <a:buFontTx/>
-              <a:buNone/>
-              <a:tabLst/>
-              <a:defRPr/>
+              <a:t>By definition, at least 2 classes to inherit from are required </a:t>
+            </a:r>
+          </a:p>
+          <a:p>
+            <a:pPr marL="0" indent="0">
+              <a:buNone/>
             </a:pPr>
             <a:endParaRPr lang="en-US" dirty="0"/>
           </a:p>
           <a:p>
-            <a:pPr marL="0" marR="0" lvl="0" indent="0" defTabSz="914400" eaLnBrk="1" fontAlgn="auto" latinLnBrk="0" hangingPunct="1">
-              <a:lnSpc>
-                <a:spcPct val="100000"/>
-              </a:lnSpc>
-              <a:spcBef>
-                <a:spcPts val="0"/>
-              </a:spcBef>
-              <a:spcAft>
-                <a:spcPts val="0"/>
-              </a:spcAft>
-              <a:buClrTx/>
-              <a:buSzTx/>
-              <a:buFontTx/>
-              <a:buNone/>
-              <a:tabLst/>
-              <a:defRPr/>
+            <a:pPr marL="0" indent="0">
+              <a:buNone/>
             </a:pPr>
             <a:endParaRPr lang="en-US" dirty="0"/>
           </a:p>
-          <a:p>
-            <a:pPr marL="0" marR="0" lvl="0" indent="0" defTabSz="914400" eaLnBrk="1" fontAlgn="auto" latinLnBrk="0" hangingPunct="1">
-              <a:lnSpc>
-                <a:spcPct val="100000"/>
-              </a:lnSpc>
-              <a:spcBef>
-                <a:spcPts val="0"/>
-              </a:spcBef>
-              <a:spcAft>
-                <a:spcPts val="0"/>
-              </a:spcAft>
-              <a:buClrTx/>
-              <a:buSzTx/>
-              <a:buFontTx/>
-              <a:buNone/>
-              <a:tabLst/>
-              <a:defRPr/>
-            </a:pPr>
-            <a:endParaRPr lang="en-US" dirty="0"/>
-          </a:p>
-          <a:p>
-            <a:pPr marL="0" marR="0" lvl="0" indent="0" defTabSz="914400" eaLnBrk="1" fontAlgn="auto" latinLnBrk="0" hangingPunct="1">
-              <a:lnSpc>
-                <a:spcPct val="100000"/>
-              </a:lnSpc>
-              <a:spcBef>
-                <a:spcPts val="0"/>
-              </a:spcBef>
-              <a:spcAft>
-                <a:spcPts val="0"/>
-              </a:spcAft>
-              <a:buClrTx/>
-              <a:buSzTx/>
-              <a:buFontTx/>
-              <a:buNone/>
-              <a:tabLst/>
-              <a:defRPr/>
-            </a:pPr>
-            <a:r>
-              <a:rPr lang="en-US" dirty="0"/>
-              <a:t>The primary difference is that this sort of breaks </a:t>
-            </a:r>
-            <a:r>
-              <a:rPr lang="en-US" i="1" dirty="0"/>
-              <a:t>super().__</a:t>
-            </a:r>
-            <a:r>
-              <a:rPr lang="en-US" i="1" dirty="0" err="1"/>
-              <a:t>init</a:t>
-            </a:r>
-            <a:r>
-              <a:rPr lang="en-US" i="1" dirty="0"/>
-              <a:t>__(</a:t>
-            </a:r>
-            <a:r>
-              <a:rPr lang="is-IS" i="1" dirty="0"/>
-              <a:t>…) </a:t>
-            </a:r>
-          </a:p>
-          <a:p>
-            <a:pPr lvl="1">
-              <a:lnSpc>
-                <a:spcPct val="100000"/>
-              </a:lnSpc>
-              <a:spcBef>
-                <a:spcPts val="0"/>
-              </a:spcBef>
-              <a:defRPr/>
-            </a:pPr>
-            <a:r>
-              <a:rPr lang="is-IS" dirty="0"/>
-              <a:t>We‘ll come back to this </a:t>
-            </a:r>
-            <a:endParaRPr lang="en-US" dirty="0"/>
-          </a:p>
         </p:txBody>
       </p:sp>
       <p:pic>
         <p:nvPicPr>
-          <p:cNvPr id="4" name="Picture 3"/>
+          <p:cNvPr id="5" name="Picture 4">
+            <a:extLst>
+              <a:ext uri="{FF2B5EF4-FFF2-40B4-BE49-F238E27FC236}">
+                <a16:creationId xmlns:a16="http://schemas.microsoft.com/office/drawing/2014/main" id="{CF8C3616-2593-D940-83E6-79D9935CC3DA}"/>
+              </a:ext>
+            </a:extLst>
+          </p:cNvPr>
           <p:cNvPicPr>
             <a:picLocks noChangeAspect="1"/>
           </p:cNvPicPr>
           <p:nvPr/>
         </p:nvPicPr>
         <p:blipFill>
-          <a:blip r:embed="rId2">
-            <a:extLst>
-              <a:ext uri="{28A0092B-C50C-407E-A947-70E740481C1C}">
-                <a14:useLocalDpi xmlns:a14="http://schemas.microsoft.com/office/drawing/2010/main" val="0"/>
-              </a:ext>
-            </a:extLst>
-          </a:blip>
+          <a:blip r:embed="rId2"/>
           <a:stretch>
             <a:fillRect/>
           </a:stretch>
         </p:blipFill>
         <p:spPr>
           <a:xfrm>
-            <a:off x="5001060" y="2183714"/>
-            <a:ext cx="7026869" cy="4167660"/>
+            <a:off x="6308867" y="2449031"/>
+            <a:ext cx="5168899" cy="3652276"/>
           </a:xfrm>
           <a:prstGeom prst="rect">
             <a:avLst/>
@@ -8869,7 +9524,7 @@
     </p:spTree>
     <p:extLst>
       <p:ext uri="{BB962C8B-B14F-4D97-AF65-F5344CB8AC3E}">
-        <p14:creationId xmlns:p14="http://schemas.microsoft.com/office/powerpoint/2010/main" val="153380600"/>
+        <p14:creationId xmlns:p14="http://schemas.microsoft.com/office/powerpoint/2010/main" val="646836821"/>
       </p:ext>
     </p:extLst>
   </p:cSld>
@@ -8898,7 +9553,13 @@
       </p:grpSpPr>
       <p:sp>
         <p:nvSpPr>
-          <p:cNvPr id="2" name="Title 1"/>
+          <p:cNvPr id="2" name="Title 1">
+            <a:extLst>
+              <a:ext uri="{FF2B5EF4-FFF2-40B4-BE49-F238E27FC236}">
+                <a16:creationId xmlns:a16="http://schemas.microsoft.com/office/drawing/2014/main" id="{57793361-385D-7A47-BBFB-96F49E1F4CA9}"/>
+              </a:ext>
+            </a:extLst>
+          </p:cNvPr>
           <p:cNvSpPr>
             <a:spLocks noGrp="1"/>
           </p:cNvSpPr>
@@ -8913,14 +9574,20 @@
           <a:p>
             <a:r>
               <a:rPr lang="en-US" dirty="0"/>
-              <a:t>The Basic Syntax</a:t>
-            </a:r>
-          </a:p>
-        </p:txBody>
-      </p:sp>
-      <p:sp>
-        <p:nvSpPr>
-          <p:cNvPr id="3" name="Content Placeholder 2"/>
+              <a:t>The Basic Syntax </a:t>
+            </a:r>
+          </a:p>
+        </p:txBody>
+      </p:sp>
+      <p:sp>
+        <p:nvSpPr>
+          <p:cNvPr id="3" name="Content Placeholder 2">
+            <a:extLst>
+              <a:ext uri="{FF2B5EF4-FFF2-40B4-BE49-F238E27FC236}">
+                <a16:creationId xmlns:a16="http://schemas.microsoft.com/office/drawing/2014/main" id="{8F904C63-297B-354B-8CF2-3329FFB10BEB}"/>
+              </a:ext>
+            </a:extLst>
+          </p:cNvPr>
           <p:cNvSpPr>
             <a:spLocks noGrp="1"/>
           </p:cNvSpPr>
@@ -8930,94 +9597,95 @@
         </p:nvSpPr>
         <p:spPr>
           <a:xfrm>
-            <a:off x="148280" y="2183714"/>
-            <a:ext cx="4744996" cy="4368799"/>
+            <a:off x="286603" y="2336872"/>
+            <a:ext cx="5049673" cy="4063927"/>
           </a:xfrm>
         </p:spPr>
         <p:txBody>
           <a:bodyPr/>
           <a:lstStyle/>
           <a:p>
-            <a:pPr marL="0" lvl="0" indent="0">
-              <a:lnSpc>
-                <a:spcPct val="100000"/>
-              </a:lnSpc>
-              <a:spcBef>
-                <a:spcPts val="0"/>
-              </a:spcBef>
+            <a:pPr marL="0" indent="0">
               <a:buNone/>
             </a:pPr>
             <a:r>
-              <a:rPr lang="is-IS" i="1" dirty="0"/>
-              <a:t>x.function(y)</a:t>
-            </a:r>
-            <a:r>
-              <a:rPr lang="is-IS" dirty="0"/>
-              <a:t> is the same as </a:t>
-            </a:r>
-            <a:r>
-              <a:rPr lang="is-IS" i="1" dirty="0"/>
-              <a:t>classname.function(x, y)</a:t>
-            </a:r>
-            <a:r>
-              <a:rPr lang="is-IS" dirty="0"/>
-              <a:t>, so use this construction to call the </a:t>
-            </a:r>
-            <a:r>
-              <a:rPr lang="is-IS" i="1" dirty="0"/>
-              <a:t>__init__ </a:t>
-            </a:r>
-            <a:r>
-              <a:rPr lang="is-IS" dirty="0"/>
-              <a:t>function passing </a:t>
-            </a:r>
-            <a:r>
-              <a:rPr lang="is-IS" i="1" dirty="0"/>
-              <a:t>self </a:t>
-            </a:r>
-            <a:r>
-              <a:rPr lang="is-IS" dirty="0"/>
-              <a:t>as an argument. </a:t>
+              <a:rPr lang="en-US" dirty="0"/>
+              <a:t>By definition, at least 2 classes to inherit from are required </a:t>
             </a:r>
           </a:p>
           <a:p>
             <a:pPr marL="0" indent="0">
-              <a:lnSpc>
-                <a:spcPct val="100000"/>
-              </a:lnSpc>
-              <a:spcBef>
-                <a:spcPts val="0"/>
-              </a:spcBef>
               <a:buNone/>
             </a:pPr>
             <a:endParaRPr lang="en-US" dirty="0"/>
           </a:p>
+          <a:p>
+            <a:pPr marL="0" indent="0">
+              <a:buNone/>
+            </a:pPr>
+            <a:r>
+              <a:rPr lang="en-US" dirty="0"/>
+              <a:t>Where you already specify the class to inherit from with single inheritance, add any additional classes! Simple, right? …</a:t>
+            </a:r>
+            <a:r>
+              <a:rPr lang="en-US" i="1" dirty="0"/>
+              <a:t>right?</a:t>
+            </a:r>
+            <a:r>
+              <a:rPr lang="en-US" dirty="0"/>
+              <a:t> </a:t>
+            </a:r>
+          </a:p>
+          <a:p>
+            <a:pPr marL="0" indent="0">
+              <a:buNone/>
+            </a:pPr>
+            <a:endParaRPr lang="en-US" dirty="0"/>
+          </a:p>
+          <a:p>
+            <a:pPr marL="0" indent="0">
+              <a:buNone/>
+            </a:pPr>
+            <a:endParaRPr lang="en-US" dirty="0"/>
+          </a:p>
+          <a:p>
+            <a:pPr marL="0" indent="0">
+              <a:buNone/>
+            </a:pPr>
+            <a:endParaRPr lang="en-US" dirty="0"/>
+          </a:p>
+          <a:p>
+            <a:pPr marL="0" indent="0">
+              <a:buNone/>
+            </a:pPr>
+            <a:endParaRPr lang="en-US" dirty="0"/>
+          </a:p>
         </p:txBody>
       </p:sp>
       <p:pic>
         <p:nvPicPr>
-          <p:cNvPr id="4" name="Picture 3"/>
+          <p:cNvPr id="6" name="Picture 5">
+            <a:extLst>
+              <a:ext uri="{FF2B5EF4-FFF2-40B4-BE49-F238E27FC236}">
+                <a16:creationId xmlns:a16="http://schemas.microsoft.com/office/drawing/2014/main" id="{E000BC62-C400-0441-88A5-FC14FBD1EA8C}"/>
+              </a:ext>
+            </a:extLst>
+          </p:cNvPr>
           <p:cNvPicPr>
             <a:picLocks noChangeAspect="1"/>
           </p:cNvPicPr>
           <p:nvPr/>
         </p:nvPicPr>
         <p:blipFill>
-          <a:blip r:embed="rId2">
-            <a:extLst>
-              <a:ext uri="{28A0092B-C50C-407E-A947-70E740481C1C}">
-                <a14:useLocalDpi xmlns:a14="http://schemas.microsoft.com/office/drawing/2010/main" val="0"/>
-              </a:ext>
-            </a:extLst>
-          </a:blip>
+          <a:blip r:embed="rId2"/>
           <a:stretch>
             <a:fillRect/>
           </a:stretch>
         </p:blipFill>
         <p:spPr>
           <a:xfrm>
-            <a:off x="5001060" y="2183714"/>
-            <a:ext cx="7026869" cy="4167660"/>
+            <a:off x="6046808" y="3047343"/>
+            <a:ext cx="5499197" cy="2223441"/>
           </a:xfrm>
           <a:prstGeom prst="rect">
             <a:avLst/>
@@ -9027,7 +9695,7 @@
     </p:spTree>
     <p:extLst>
       <p:ext uri="{BB962C8B-B14F-4D97-AF65-F5344CB8AC3E}">
-        <p14:creationId xmlns:p14="http://schemas.microsoft.com/office/powerpoint/2010/main" val="1787395751"/>
+        <p14:creationId xmlns:p14="http://schemas.microsoft.com/office/powerpoint/2010/main" val="4157622708"/>
       </p:ext>
     </p:extLst>
   </p:cSld>
@@ -9056,7 +9724,13 @@
       </p:grpSpPr>
       <p:sp>
         <p:nvSpPr>
-          <p:cNvPr id="2" name="Title 1"/>
+          <p:cNvPr id="2" name="Title 1">
+            <a:extLst>
+              <a:ext uri="{FF2B5EF4-FFF2-40B4-BE49-F238E27FC236}">
+                <a16:creationId xmlns:a16="http://schemas.microsoft.com/office/drawing/2014/main" id="{57793361-385D-7A47-BBFB-96F49E1F4CA9}"/>
+              </a:ext>
+            </a:extLst>
+          </p:cNvPr>
           <p:cNvSpPr>
             <a:spLocks noGrp="1"/>
           </p:cNvSpPr>
@@ -9071,14 +9745,20 @@
           <a:p>
             <a:r>
               <a:rPr lang="en-US" dirty="0"/>
-              <a:t>The Basic Syntax</a:t>
-            </a:r>
-          </a:p>
-        </p:txBody>
-      </p:sp>
-      <p:sp>
-        <p:nvSpPr>
-          <p:cNvPr id="3" name="Content Placeholder 2"/>
+              <a:t>The Basic Syntax </a:t>
+            </a:r>
+          </a:p>
+        </p:txBody>
+      </p:sp>
+      <p:sp>
+        <p:nvSpPr>
+          <p:cNvPr id="3" name="Content Placeholder 2">
+            <a:extLst>
+              <a:ext uri="{FF2B5EF4-FFF2-40B4-BE49-F238E27FC236}">
+                <a16:creationId xmlns:a16="http://schemas.microsoft.com/office/drawing/2014/main" id="{8F904C63-297B-354B-8CF2-3329FFB10BEB}"/>
+              </a:ext>
+            </a:extLst>
+          </p:cNvPr>
           <p:cNvSpPr>
             <a:spLocks noGrp="1"/>
           </p:cNvSpPr>
@@ -9088,153 +9768,99 @@
         </p:nvSpPr>
         <p:spPr>
           <a:xfrm>
-            <a:off x="148280" y="2183714"/>
-            <a:ext cx="4744996" cy="4368799"/>
-          </a:xfrm>
-        </p:spPr>
-        <p:txBody>
-          <a:bodyPr/>
+            <a:off x="286603" y="2336872"/>
+            <a:ext cx="5049673" cy="4254997"/>
+          </a:xfrm>
+        </p:spPr>
+        <p:txBody>
+          <a:bodyPr>
+            <a:normAutofit/>
+          </a:bodyPr>
           <a:lstStyle/>
           <a:p>
-            <a:pPr marL="0" lvl="0" indent="0">
-              <a:lnSpc>
-                <a:spcPct val="100000"/>
-              </a:lnSpc>
-              <a:spcBef>
-                <a:spcPts val="0"/>
-              </a:spcBef>
+            <a:pPr marL="0" indent="0">
               <a:buNone/>
             </a:pPr>
             <a:r>
-              <a:rPr lang="is-IS" i="1" dirty="0"/>
-              <a:t>x.function(y)</a:t>
-            </a:r>
-            <a:r>
-              <a:rPr lang="is-IS" dirty="0"/>
-              <a:t> is the same as </a:t>
-            </a:r>
-            <a:r>
-              <a:rPr lang="is-IS" i="1" dirty="0"/>
-              <a:t>classname.function(x, y)</a:t>
-            </a:r>
-            <a:r>
-              <a:rPr lang="is-IS" dirty="0"/>
-              <a:t>, so use this construction to call the </a:t>
-            </a:r>
-            <a:r>
-              <a:rPr lang="is-IS" i="1" dirty="0"/>
-              <a:t>__init__ </a:t>
-            </a:r>
-            <a:r>
-              <a:rPr lang="is-IS" dirty="0"/>
-              <a:t>function passing </a:t>
-            </a:r>
-            <a:r>
-              <a:rPr lang="is-IS" i="1" dirty="0"/>
-              <a:t>self </a:t>
-            </a:r>
-            <a:r>
-              <a:rPr lang="is-IS" dirty="0"/>
-              <a:t>as an argument. </a:t>
-            </a:r>
-          </a:p>
-          <a:p>
-            <a:pPr marL="0" lvl="0" indent="0">
-              <a:lnSpc>
-                <a:spcPct val="100000"/>
-              </a:lnSpc>
-              <a:spcBef>
-                <a:spcPts val="0"/>
-              </a:spcBef>
-              <a:buNone/>
-            </a:pPr>
-            <a:endParaRPr lang="is-IS" dirty="0"/>
-          </a:p>
-          <a:p>
-            <a:pPr marL="0" lvl="0" indent="0">
-              <a:lnSpc>
-                <a:spcPct val="100000"/>
-              </a:lnSpc>
-              <a:spcBef>
-                <a:spcPts val="0"/>
-              </a:spcBef>
-              <a:buNone/>
-            </a:pPr>
-            <a:endParaRPr lang="is-IS" dirty="0"/>
-          </a:p>
-          <a:p>
-            <a:pPr marL="0" lvl="0" indent="0">
-              <a:lnSpc>
-                <a:spcPct val="100000"/>
-              </a:lnSpc>
-              <a:spcBef>
-                <a:spcPts val="0"/>
-              </a:spcBef>
-              <a:buNone/>
-            </a:pPr>
-            <a:endParaRPr lang="is-IS" dirty="0"/>
-          </a:p>
-          <a:p>
-            <a:pPr marL="0" lvl="0" indent="0">
-              <a:lnSpc>
-                <a:spcPct val="100000"/>
-              </a:lnSpc>
-              <a:spcBef>
-                <a:spcPts val="0"/>
-              </a:spcBef>
-              <a:buNone/>
-            </a:pPr>
-            <a:r>
-              <a:rPr lang="is-IS" dirty="0"/>
-              <a:t>The same construction can be used to write the </a:t>
-            </a:r>
-            <a:r>
-              <a:rPr lang="is-IS" i="1" dirty="0"/>
-              <a:t>__call__</a:t>
-            </a:r>
-            <a:r>
-              <a:rPr lang="is-IS" dirty="0"/>
-              <a:t> function! </a:t>
+              <a:rPr lang="en-US" dirty="0"/>
+              <a:t>By definition, at least 2 classes to inherit from are required </a:t>
             </a:r>
           </a:p>
           <a:p>
             <a:pPr marL="0" indent="0">
-              <a:lnSpc>
-                <a:spcPct val="100000"/>
-              </a:lnSpc>
-              <a:spcBef>
-                <a:spcPts val="0"/>
-              </a:spcBef>
               <a:buNone/>
             </a:pPr>
             <a:endParaRPr lang="en-US" dirty="0"/>
           </a:p>
+          <a:p>
+            <a:pPr marL="0" indent="0">
+              <a:buNone/>
+            </a:pPr>
+            <a:r>
+              <a:rPr lang="en-US" dirty="0"/>
+              <a:t>Where you already specify the class to inherit from with single inheritance, add any additional classes! Simple, right? …</a:t>
+            </a:r>
+            <a:r>
+              <a:rPr lang="en-US" i="1" dirty="0"/>
+              <a:t>right?</a:t>
+            </a:r>
+            <a:r>
+              <a:rPr lang="en-US" dirty="0"/>
+              <a:t> </a:t>
+            </a:r>
+          </a:p>
+          <a:p>
+            <a:pPr marL="0" indent="0">
+              <a:buNone/>
+            </a:pPr>
+            <a:endParaRPr lang="en-US" dirty="0"/>
+          </a:p>
+          <a:p>
+            <a:pPr marL="0" indent="0">
+              <a:buNone/>
+            </a:pPr>
+            <a:r>
+              <a:rPr lang="en-US" dirty="0"/>
+              <a:t>Unfortunately, multiple inheritance sort of breaks </a:t>
+            </a:r>
+            <a:r>
+              <a:rPr lang="en-US" i="1" dirty="0"/>
+              <a:t>super</a:t>
+            </a:r>
+            <a:endParaRPr lang="en-US" dirty="0"/>
+          </a:p>
+          <a:p>
+            <a:pPr marL="0" indent="0">
+              <a:buNone/>
+            </a:pPr>
+            <a:endParaRPr lang="en-US" dirty="0"/>
+          </a:p>
         </p:txBody>
       </p:sp>
       <p:pic>
         <p:nvPicPr>
-          <p:cNvPr id="5" name="Picture 4"/>
+          <p:cNvPr id="5" name="Picture 4">
+            <a:extLst>
+              <a:ext uri="{FF2B5EF4-FFF2-40B4-BE49-F238E27FC236}">
+                <a16:creationId xmlns:a16="http://schemas.microsoft.com/office/drawing/2014/main" id="{41C75911-0B00-DE45-A0B3-596E60D9A165}"/>
+              </a:ext>
+            </a:extLst>
+          </p:cNvPr>
           <p:cNvPicPr>
             <a:picLocks noChangeAspect="1"/>
           </p:cNvPicPr>
           <p:nvPr/>
         </p:nvPicPr>
         <p:blipFill>
-          <a:blip r:embed="rId3">
-            <a:extLst>
-              <a:ext uri="{28A0092B-C50C-407E-A947-70E740481C1C}">
-                <a14:useLocalDpi xmlns:a14="http://schemas.microsoft.com/office/drawing/2010/main" val="0"/>
-              </a:ext>
-            </a:extLst>
-          </a:blip>
+          <a:blip r:embed="rId2"/>
           <a:stretch>
             <a:fillRect/>
           </a:stretch>
         </p:blipFill>
         <p:spPr>
           <a:xfrm>
-            <a:off x="5008263" y="2148649"/>
-            <a:ext cx="6841867" cy="4438928"/>
+            <a:off x="5336276" y="2336872"/>
+            <a:ext cx="6584608" cy="4039197"/>
           </a:xfrm>
           <a:prstGeom prst="rect">
             <a:avLst/>
@@ -9244,7 +9870,7 @@
     </p:spTree>
     <p:extLst>
       <p:ext uri="{BB962C8B-B14F-4D97-AF65-F5344CB8AC3E}">
-        <p14:creationId xmlns:p14="http://schemas.microsoft.com/office/powerpoint/2010/main" val="947720690"/>
+        <p14:creationId xmlns:p14="http://schemas.microsoft.com/office/powerpoint/2010/main" val="3616412689"/>
       </p:ext>
     </p:extLst>
   </p:cSld>
@@ -9273,7 +9899,13 @@
       </p:grpSpPr>
       <p:sp>
         <p:nvSpPr>
-          <p:cNvPr id="2" name="Title 1"/>
+          <p:cNvPr id="2" name="Title 1">
+            <a:extLst>
+              <a:ext uri="{FF2B5EF4-FFF2-40B4-BE49-F238E27FC236}">
+                <a16:creationId xmlns:a16="http://schemas.microsoft.com/office/drawing/2014/main" id="{F8169958-8101-0B4E-9616-87CEF9600430}"/>
+              </a:ext>
+            </a:extLst>
+          </p:cNvPr>
           <p:cNvSpPr>
             <a:spLocks noGrp="1"/>
           </p:cNvSpPr>
@@ -9288,14 +9920,20 @@
           <a:p>
             <a:r>
               <a:rPr lang="en-US" dirty="0"/>
-              <a:t>The Method Resolution Order</a:t>
-            </a:r>
-          </a:p>
-        </p:txBody>
-      </p:sp>
-      <p:sp>
-        <p:nvSpPr>
-          <p:cNvPr id="3" name="Content Placeholder 2"/>
+              <a:t>The Method Resolution Order </a:t>
+            </a:r>
+          </a:p>
+        </p:txBody>
+      </p:sp>
+      <p:sp>
+        <p:nvSpPr>
+          <p:cNvPr id="3" name="Content Placeholder 2">
+            <a:extLst>
+              <a:ext uri="{FF2B5EF4-FFF2-40B4-BE49-F238E27FC236}">
+                <a16:creationId xmlns:a16="http://schemas.microsoft.com/office/drawing/2014/main" id="{8895ED6B-835C-874F-8DF2-E54C73CA29F0}"/>
+              </a:ext>
+            </a:extLst>
+          </p:cNvPr>
           <p:cNvSpPr>
             <a:spLocks noGrp="1"/>
           </p:cNvSpPr>
@@ -9305,141 +9943,123 @@
         </p:nvSpPr>
         <p:spPr>
           <a:xfrm>
-            <a:off x="172995" y="2336873"/>
-            <a:ext cx="4831491" cy="4212208"/>
+            <a:off x="680321" y="2336872"/>
+            <a:ext cx="5488467" cy="4077575"/>
           </a:xfrm>
         </p:spPr>
         <p:txBody>
           <a:bodyPr/>
           <a:lstStyle/>
           <a:p>
-            <a:pPr marL="0" marR="0" lvl="0" indent="0" defTabSz="914400" eaLnBrk="1" fontAlgn="auto" latinLnBrk="0" hangingPunct="1">
-              <a:lnSpc>
-                <a:spcPct val="100000"/>
-              </a:lnSpc>
-              <a:spcBef>
-                <a:spcPts val="0"/>
-              </a:spcBef>
-              <a:spcAft>
-                <a:spcPts val="0"/>
-              </a:spcAft>
-              <a:buClrTx/>
-              <a:buSzTx/>
-              <a:buFontTx/>
-              <a:buNone/>
-              <a:tabLst/>
-              <a:defRPr/>
+            <a:pPr marL="0" indent="0">
+              <a:buNone/>
             </a:pPr>
             <a:r>
               <a:rPr lang="en-US" dirty="0"/>
-              <a:t>The MRO is the reason </a:t>
-            </a:r>
-            <a:r>
-              <a:rPr lang="en-US" i="1" dirty="0"/>
-              <a:t>super()</a:t>
-            </a:r>
-            <a:r>
-              <a:rPr lang="en-US" dirty="0"/>
-              <a:t> may not always do what you want when using multiple inheritance </a:t>
-            </a:r>
-          </a:p>
-          <a:p>
-            <a:pPr marL="0" marR="0" lvl="0" indent="0" defTabSz="914400" eaLnBrk="1" fontAlgn="auto" latinLnBrk="0" hangingPunct="1">
-              <a:lnSpc>
-                <a:spcPct val="100000"/>
-              </a:lnSpc>
-              <a:spcBef>
-                <a:spcPts val="0"/>
-              </a:spcBef>
-              <a:spcAft>
-                <a:spcPts val="0"/>
-              </a:spcAft>
-              <a:buClrTx/>
-              <a:buSzTx/>
-              <a:buFontTx/>
-              <a:buNone/>
-              <a:tabLst/>
-              <a:defRPr/>
+              <a:t>When you call a function within a class, it looks first within that class, then the first parent class, then the second parent class, and so on </a:t>
+            </a:r>
+          </a:p>
+          <a:p>
+            <a:pPr marL="0" indent="0">
+              <a:buNone/>
             </a:pPr>
             <a:endParaRPr lang="en-US" dirty="0"/>
           </a:p>
           <a:p>
-            <a:pPr marL="0" marR="0" lvl="0" indent="0" defTabSz="914400" eaLnBrk="1" fontAlgn="auto" latinLnBrk="0" hangingPunct="1">
-              <a:lnSpc>
-                <a:spcPct val="100000"/>
-              </a:lnSpc>
-              <a:spcBef>
-                <a:spcPts val="0"/>
-              </a:spcBef>
-              <a:spcAft>
-                <a:spcPts val="0"/>
-              </a:spcAft>
-              <a:buClrTx/>
-              <a:buSzTx/>
-              <a:buFontTx/>
-              <a:buNone/>
-              <a:tabLst/>
-              <a:defRPr/>
+            <a:pPr marL="0" indent="0">
+              <a:buNone/>
             </a:pPr>
-            <a:endParaRPr lang="en-US" dirty="0"/>
-          </a:p>
-          <a:p>
-            <a:pPr marL="0" marR="0" lvl="0" indent="0" defTabSz="914400" eaLnBrk="1" fontAlgn="auto" latinLnBrk="0" hangingPunct="1">
-              <a:lnSpc>
-                <a:spcPct val="100000"/>
-              </a:lnSpc>
-              <a:spcBef>
-                <a:spcPts val="0"/>
-              </a:spcBef>
-              <a:spcAft>
-                <a:spcPts val="0"/>
-              </a:spcAft>
-              <a:buClrTx/>
-              <a:buSzTx/>
-              <a:buFontTx/>
-              <a:buNone/>
-              <a:tabLst/>
-              <a:defRPr/>
-            </a:pPr>
             <a:r>
               <a:rPr lang="en-US" dirty="0"/>
-              <a:t>To see this in action, let’s deliberately bug the code and insert </a:t>
+              <a:t>Any call to </a:t>
             </a:r>
             <a:r>
               <a:rPr lang="en-US" i="1" dirty="0"/>
-              <a:t>super()</a:t>
+              <a:t>super</a:t>
             </a:r>
             <a:r>
               <a:rPr lang="en-US" dirty="0"/>
-              <a:t> to see what happens </a:t>
+              <a:t> is a call to classes further down the MRO</a:t>
+            </a:r>
+          </a:p>
+          <a:p>
+            <a:pPr lvl="1"/>
+            <a:r>
+              <a:rPr lang="en-US" dirty="0"/>
+              <a:t>This has been true all along for single inheritance too! </a:t>
+            </a:r>
+          </a:p>
+          <a:p>
+            <a:pPr lvl="1"/>
+            <a:r>
+              <a:rPr lang="en-US" dirty="0"/>
+              <a:t>With multiple inheritance, </a:t>
+            </a:r>
+            <a:r>
+              <a:rPr lang="en-US" i="1" dirty="0"/>
+              <a:t>super</a:t>
+            </a:r>
+            <a:r>
+              <a:rPr lang="en-US" dirty="0"/>
+              <a:t> probably doesn’t do what you want it to do… </a:t>
             </a:r>
           </a:p>
         </p:txBody>
       </p:sp>
       <p:pic>
         <p:nvPicPr>
-          <p:cNvPr id="4" name="Picture 3"/>
+          <p:cNvPr id="5" name="Picture 4">
+            <a:extLst>
+              <a:ext uri="{FF2B5EF4-FFF2-40B4-BE49-F238E27FC236}">
+                <a16:creationId xmlns:a16="http://schemas.microsoft.com/office/drawing/2014/main" id="{56860AFC-A1F9-F44F-97CD-441DDFB9D1B7}"/>
+              </a:ext>
+            </a:extLst>
+          </p:cNvPr>
           <p:cNvPicPr>
             <a:picLocks noChangeAspect="1"/>
           </p:cNvPicPr>
           <p:nvPr/>
         </p:nvPicPr>
         <p:blipFill>
-          <a:blip r:embed="rId2">
-            <a:extLst>
-              <a:ext uri="{28A0092B-C50C-407E-A947-70E740481C1C}">
-                <a14:useLocalDpi xmlns:a14="http://schemas.microsoft.com/office/drawing/2010/main" val="0"/>
-              </a:ext>
-            </a:extLst>
-          </a:blip>
+          <a:blip r:embed="rId2"/>
           <a:stretch>
             <a:fillRect/>
           </a:stretch>
         </p:blipFill>
         <p:spPr>
           <a:xfrm>
-            <a:off x="5165124" y="2170941"/>
-            <a:ext cx="6678484" cy="4501708"/>
+            <a:off x="6713561" y="2336873"/>
+            <a:ext cx="4833731" cy="1954379"/>
+          </a:xfrm>
+          <a:prstGeom prst="rect">
+            <a:avLst/>
+          </a:prstGeom>
+        </p:spPr>
+      </p:pic>
+      <p:pic>
+        <p:nvPicPr>
+          <p:cNvPr id="7" name="Picture 6">
+            <a:extLst>
+              <a:ext uri="{FF2B5EF4-FFF2-40B4-BE49-F238E27FC236}">
+                <a16:creationId xmlns:a16="http://schemas.microsoft.com/office/drawing/2014/main" id="{1DA190F6-2F8A-9143-AFFC-042F2640A778}"/>
+              </a:ext>
+            </a:extLst>
+          </p:cNvPr>
+          <p:cNvPicPr>
+            <a:picLocks noChangeAspect="1"/>
+          </p:cNvPicPr>
+          <p:nvPr/>
+        </p:nvPicPr>
+        <p:blipFill>
+          <a:blip r:embed="rId3"/>
+          <a:stretch>
+            <a:fillRect/>
+          </a:stretch>
+        </p:blipFill>
+        <p:spPr>
+          <a:xfrm>
+            <a:off x="6615826" y="5186889"/>
+            <a:ext cx="5029200" cy="749300"/>
           </a:xfrm>
           <a:prstGeom prst="rect">
             <a:avLst/>
@@ -9449,7 +10069,7 @@
     </p:spTree>
     <p:extLst>
       <p:ext uri="{BB962C8B-B14F-4D97-AF65-F5344CB8AC3E}">
-        <p14:creationId xmlns:p14="http://schemas.microsoft.com/office/powerpoint/2010/main" val="1394449658"/>
+        <p14:creationId xmlns:p14="http://schemas.microsoft.com/office/powerpoint/2010/main" val="1854015835"/>
       </p:ext>
     </p:extLst>
   </p:cSld>
@@ -9478,7 +10098,13 @@
       </p:grpSpPr>
       <p:sp>
         <p:nvSpPr>
-          <p:cNvPr id="2" name="Title 1"/>
+          <p:cNvPr id="2" name="Title 1">
+            <a:extLst>
+              <a:ext uri="{FF2B5EF4-FFF2-40B4-BE49-F238E27FC236}">
+                <a16:creationId xmlns:a16="http://schemas.microsoft.com/office/drawing/2014/main" id="{57793361-385D-7A47-BBFB-96F49E1F4CA9}"/>
+              </a:ext>
+            </a:extLst>
+          </p:cNvPr>
           <p:cNvSpPr>
             <a:spLocks noGrp="1"/>
           </p:cNvSpPr>
@@ -9493,14 +10119,20 @@
           <a:p>
             <a:r>
               <a:rPr lang="en-US" dirty="0"/>
-              <a:t>The Method Resolution Order</a:t>
-            </a:r>
-          </a:p>
-        </p:txBody>
-      </p:sp>
-      <p:sp>
-        <p:nvSpPr>
-          <p:cNvPr id="3" name="Content Placeholder 2"/>
+              <a:t>The Basic Syntax</a:t>
+            </a:r>
+          </a:p>
+        </p:txBody>
+      </p:sp>
+      <p:sp>
+        <p:nvSpPr>
+          <p:cNvPr id="3" name="Content Placeholder 2">
+            <a:extLst>
+              <a:ext uri="{FF2B5EF4-FFF2-40B4-BE49-F238E27FC236}">
+                <a16:creationId xmlns:a16="http://schemas.microsoft.com/office/drawing/2014/main" id="{8F904C63-297B-354B-8CF2-3329FFB10BEB}"/>
+              </a:ext>
+            </a:extLst>
+          </p:cNvPr>
           <p:cNvSpPr>
             <a:spLocks noGrp="1"/>
           </p:cNvSpPr>
@@ -9510,176 +10142,119 @@
         </p:nvSpPr>
         <p:spPr>
           <a:xfrm>
-            <a:off x="172995" y="2336873"/>
-            <a:ext cx="4831491" cy="4212208"/>
-          </a:xfrm>
-        </p:spPr>
-        <p:txBody>
-          <a:bodyPr/>
+            <a:off x="286603" y="2336872"/>
+            <a:ext cx="5049673" cy="4254997"/>
+          </a:xfrm>
+        </p:spPr>
+        <p:txBody>
+          <a:bodyPr>
+            <a:normAutofit/>
+          </a:bodyPr>
           <a:lstStyle/>
           <a:p>
-            <a:pPr marL="0" marR="0" lvl="0" indent="0" defTabSz="914400" eaLnBrk="1" fontAlgn="auto" latinLnBrk="0" hangingPunct="1">
-              <a:lnSpc>
-                <a:spcPct val="100000"/>
-              </a:lnSpc>
-              <a:spcBef>
-                <a:spcPts val="0"/>
-              </a:spcBef>
-              <a:spcAft>
-                <a:spcPts val="0"/>
-              </a:spcAft>
-              <a:buClrTx/>
-              <a:buSzTx/>
-              <a:buFontTx/>
-              <a:buNone/>
-              <a:tabLst/>
-              <a:defRPr/>
+            <a:pPr marL="0" indent="0">
+              <a:buNone/>
             </a:pPr>
             <a:r>
               <a:rPr lang="en-US" dirty="0"/>
-              <a:t>The MRO is the reason </a:t>
+              <a:t>Instead, invoke the inherited class directly and pass </a:t>
             </a:r>
             <a:r>
               <a:rPr lang="en-US" i="1" dirty="0"/>
-              <a:t>super()</a:t>
+              <a:t>self</a:t>
             </a:r>
             <a:r>
               <a:rPr lang="en-US" dirty="0"/>
-              <a:t> may not always do what you want when using multiple inheritance </a:t>
-            </a:r>
-          </a:p>
-          <a:p>
-            <a:pPr marL="0" marR="0" lvl="0" indent="0" defTabSz="914400" eaLnBrk="1" fontAlgn="auto" latinLnBrk="0" hangingPunct="1">
-              <a:lnSpc>
-                <a:spcPct val="100000"/>
-              </a:lnSpc>
-              <a:spcBef>
-                <a:spcPts val="0"/>
-              </a:spcBef>
-              <a:spcAft>
-                <a:spcPts val="0"/>
-              </a:spcAft>
-              <a:buClrTx/>
-              <a:buSzTx/>
-              <a:buFontTx/>
-              <a:buNone/>
-              <a:tabLst/>
-              <a:defRPr/>
-            </a:pPr>
-            <a:endParaRPr lang="en-US" dirty="0"/>
-          </a:p>
-          <a:p>
-            <a:pPr marL="0" marR="0" lvl="0" indent="0" defTabSz="914400" eaLnBrk="1" fontAlgn="auto" latinLnBrk="0" hangingPunct="1">
-              <a:lnSpc>
-                <a:spcPct val="100000"/>
-              </a:lnSpc>
-              <a:spcBef>
-                <a:spcPts val="0"/>
-              </a:spcBef>
-              <a:spcAft>
-                <a:spcPts val="0"/>
-              </a:spcAft>
-              <a:buClrTx/>
-              <a:buSzTx/>
-              <a:buFontTx/>
-              <a:buNone/>
-              <a:tabLst/>
-              <a:defRPr/>
-            </a:pPr>
-            <a:endParaRPr lang="en-US" dirty="0"/>
-          </a:p>
-          <a:p>
-            <a:pPr marL="0" marR="0" lvl="0" indent="0" defTabSz="914400" eaLnBrk="1" fontAlgn="auto" latinLnBrk="0" hangingPunct="1">
-              <a:lnSpc>
-                <a:spcPct val="100000"/>
-              </a:lnSpc>
-              <a:spcBef>
-                <a:spcPts val="0"/>
-              </a:spcBef>
-              <a:spcAft>
-                <a:spcPts val="0"/>
-              </a:spcAft>
-              <a:buClrTx/>
-              <a:buSzTx/>
-              <a:buFontTx/>
-              <a:buNone/>
-              <a:tabLst/>
-              <a:defRPr/>
-            </a:pPr>
+              <a:t> as the first argument</a:t>
+            </a:r>
+          </a:p>
+          <a:p>
+            <a:pPr lvl="1"/>
             <a:r>
               <a:rPr lang="en-US" dirty="0"/>
-              <a:t>To see this in action, let’s deliberately bug the code and insert </a:t>
+              <a:t>This takes advantage of the fact that </a:t>
+            </a:r>
+            <a:r>
+              <a:rPr lang="en-US" i="1" dirty="0" err="1"/>
+              <a:t>x.function</a:t>
             </a:r>
             <a:r>
               <a:rPr lang="en-US" i="1" dirty="0"/>
-              <a:t>super()</a:t>
+              <a:t>(y) </a:t>
             </a:r>
             <a:r>
               <a:rPr lang="en-US" dirty="0"/>
-              <a:t> to see what happens </a:t>
-            </a:r>
-          </a:p>
-          <a:p>
-            <a:pPr lvl="1">
-              <a:lnSpc>
-                <a:spcPct val="100000"/>
-              </a:lnSpc>
-              <a:spcBef>
-                <a:spcPts val="0"/>
-              </a:spcBef>
-            </a:pPr>
+              <a:t>is equivalent to </a:t>
+            </a:r>
+            <a:r>
+              <a:rPr lang="en-US" i="1" dirty="0" err="1"/>
+              <a:t>classname.function</a:t>
+            </a:r>
+            <a:r>
+              <a:rPr lang="en-US" i="1" dirty="0"/>
+              <a:t>(x, y)</a:t>
+            </a:r>
             <a:r>
               <a:rPr lang="en-US" dirty="0"/>
-              <a:t>It’s just calling </a:t>
-            </a:r>
-            <a:r>
-              <a:rPr lang="en-US" i="1" dirty="0"/>
-              <a:t>exponential </a:t>
-            </a:r>
-            <a:r>
-              <a:rPr lang="en-US" dirty="0"/>
-              <a:t>for values of </a:t>
-            </a:r>
-            <a:r>
-              <a:rPr lang="en-US" i="1" dirty="0"/>
-              <a:t>x</a:t>
-            </a:r>
-            <a:r>
-              <a:rPr lang="en-US" dirty="0"/>
-              <a:t> where it should be calling </a:t>
-            </a:r>
-            <a:r>
-              <a:rPr lang="en-US" i="1" dirty="0"/>
-              <a:t>sinusoid</a:t>
-            </a:r>
-            <a:endParaRPr lang="en-US" dirty="0"/>
+              <a:t> </a:t>
+            </a:r>
           </a:p>
         </p:txBody>
       </p:sp>
       <p:pic>
         <p:nvPicPr>
-          <p:cNvPr id="5" name="Picture 4"/>
+          <p:cNvPr id="6" name="Picture 5">
+            <a:extLst>
+              <a:ext uri="{FF2B5EF4-FFF2-40B4-BE49-F238E27FC236}">
+                <a16:creationId xmlns:a16="http://schemas.microsoft.com/office/drawing/2014/main" id="{5A0B66A9-34C7-9D49-9E75-BCBD1BC49D8C}"/>
+              </a:ext>
+            </a:extLst>
+          </p:cNvPr>
           <p:cNvPicPr>
             <a:picLocks noChangeAspect="1"/>
           </p:cNvPicPr>
           <p:nvPr/>
         </p:nvPicPr>
         <p:blipFill>
-          <a:blip r:embed="rId2">
-            <a:extLst>
-              <a:ext uri="{28A0092B-C50C-407E-A947-70E740481C1C}">
-                <a14:useLocalDpi xmlns:a14="http://schemas.microsoft.com/office/drawing/2010/main" val="0"/>
-              </a:ext>
-            </a:extLst>
-          </a:blip>
+          <a:blip r:embed="rId2"/>
           <a:stretch>
             <a:fillRect/>
           </a:stretch>
         </p:blipFill>
         <p:spPr>
           <a:xfrm>
-            <a:off x="5309286" y="2364703"/>
-            <a:ext cx="6516130" cy="4184378"/>
+            <a:off x="680321" y="4464370"/>
+            <a:ext cx="5076116" cy="2185957"/>
+          </a:xfrm>
+          <a:prstGeom prst="rect">
+            <a:avLst/>
+          </a:prstGeom>
+        </p:spPr>
+      </p:pic>
+      <p:pic>
+        <p:nvPicPr>
+          <p:cNvPr id="8" name="Picture 7">
+            <a:extLst>
+              <a:ext uri="{FF2B5EF4-FFF2-40B4-BE49-F238E27FC236}">
+                <a16:creationId xmlns:a16="http://schemas.microsoft.com/office/drawing/2014/main" id="{188ACD88-60CA-FB4B-B96C-CFB6109A0EA4}"/>
+              </a:ext>
+            </a:extLst>
+          </p:cNvPr>
+          <p:cNvPicPr>
+            <a:picLocks noChangeAspect="1"/>
+          </p:cNvPicPr>
+          <p:nvPr/>
+        </p:nvPicPr>
+        <p:blipFill>
+          <a:blip r:embed="rId3"/>
+          <a:stretch>
+            <a:fillRect/>
+          </a:stretch>
+        </p:blipFill>
+        <p:spPr>
+          <a:xfrm>
+            <a:off x="6897237" y="2336872"/>
+            <a:ext cx="3884494" cy="3968032"/>
           </a:xfrm>
           <a:prstGeom prst="rect">
             <a:avLst/>
@@ -9689,7 +10264,7 @@
     </p:spTree>
     <p:extLst>
       <p:ext uri="{BB962C8B-B14F-4D97-AF65-F5344CB8AC3E}">
-        <p14:creationId xmlns:p14="http://schemas.microsoft.com/office/powerpoint/2010/main" val="961050770"/>
+        <p14:creationId xmlns:p14="http://schemas.microsoft.com/office/powerpoint/2010/main" val="3172276211"/>
       </p:ext>
     </p:extLst>
   </p:cSld>
@@ -9733,7 +10308,7 @@
           <a:p>
             <a:r>
               <a:rPr lang="en-US" dirty="0"/>
-              <a:t>The Method Resolution Order</a:t>
+              <a:t>Example: A Piece-Wise Function</a:t>
             </a:r>
           </a:p>
         </p:txBody>
@@ -9750,8 +10325,8 @@
         </p:nvSpPr>
         <p:spPr>
           <a:xfrm>
-            <a:off x="172995" y="2336873"/>
-            <a:ext cx="4831491" cy="4212208"/>
+            <a:off x="148280" y="2183714"/>
+            <a:ext cx="4744996" cy="4368799"/>
           </a:xfrm>
         </p:spPr>
         <p:txBody>
@@ -9777,16 +10352,47 @@
             </a:pPr>
             <a:r>
               <a:rPr lang="en-US" dirty="0"/>
-              <a:t>The MRO is the reason </a:t>
-            </a:r>
+              <a:t>The two base classes </a:t>
+            </a:r>
+          </a:p>
+          <a:p>
+            <a:pPr lvl="1">
+              <a:lnSpc>
+                <a:spcPct val="100000"/>
+              </a:lnSpc>
+              <a:spcBef>
+                <a:spcPts val="0"/>
+              </a:spcBef>
+              <a:defRPr/>
+            </a:pPr>
             <a:r>
               <a:rPr lang="en-US" i="1" dirty="0"/>
-              <a:t>super()</a:t>
+              <a:t>exponential</a:t>
             </a:r>
             <a:r>
               <a:rPr lang="en-US" dirty="0"/>
-              <a:t> may not always do what you want when using multiple inheritance </a:t>
-            </a:r>
+              <a:t> describes a classic e-folding function </a:t>
+            </a:r>
+          </a:p>
+          <a:p>
+            <a:pPr lvl="1">
+              <a:lnSpc>
+                <a:spcPct val="100000"/>
+              </a:lnSpc>
+              <a:spcBef>
+                <a:spcPts val="0"/>
+              </a:spcBef>
+              <a:defRPr/>
+            </a:pPr>
+            <a:r>
+              <a:rPr lang="en-US" i="1" dirty="0"/>
+              <a:t>sinusoid</a:t>
+            </a:r>
+            <a:r>
+              <a:rPr lang="en-US" dirty="0"/>
+              <a:t> describes a sine or cosine function</a:t>
+            </a:r>
+            <a:endParaRPr lang="en-US" i="1" dirty="0"/>
           </a:p>
           <a:p>
             <a:pPr marL="0" marR="0" lvl="0" indent="0" defTabSz="914400" eaLnBrk="1" fontAlgn="auto" latinLnBrk="0" hangingPunct="1">
@@ -9808,57 +10414,6 @@
             </a:pPr>
             <a:endParaRPr lang="en-US" dirty="0"/>
           </a:p>
-          <a:p>
-            <a:pPr marL="0" marR="0" lvl="0" indent="0" defTabSz="914400" eaLnBrk="1" fontAlgn="auto" latinLnBrk="0" hangingPunct="1">
-              <a:lnSpc>
-                <a:spcPct val="100000"/>
-              </a:lnSpc>
-              <a:spcBef>
-                <a:spcPts val="0"/>
-              </a:spcBef>
-              <a:spcAft>
-                <a:spcPts val="0"/>
-              </a:spcAft>
-              <a:buClrTx/>
-              <a:buSzTx/>
-              <a:buFontTx/>
-              <a:buNone/>
-              <a:tabLst/>
-              <a:defRPr/>
-            </a:pPr>
-            <a:endParaRPr lang="en-US" dirty="0"/>
-          </a:p>
-          <a:p>
-            <a:pPr marL="0" marR="0" lvl="0" indent="0" defTabSz="914400" eaLnBrk="1" fontAlgn="auto" latinLnBrk="0" hangingPunct="1">
-              <a:lnSpc>
-                <a:spcPct val="100000"/>
-              </a:lnSpc>
-              <a:spcBef>
-                <a:spcPts val="0"/>
-              </a:spcBef>
-              <a:spcAft>
-                <a:spcPts val="0"/>
-              </a:spcAft>
-              <a:buClrTx/>
-              <a:buSzTx/>
-              <a:buFontTx/>
-              <a:buNone/>
-              <a:tabLst/>
-              <a:defRPr/>
-            </a:pPr>
-            <a:r>
-              <a:rPr lang="en-US" dirty="0"/>
-              <a:t>When you call </a:t>
-            </a:r>
-            <a:r>
-              <a:rPr lang="en-US" i="1" dirty="0"/>
-              <a:t>super()</a:t>
-            </a:r>
-            <a:r>
-              <a:rPr lang="en-US" dirty="0"/>
-              <a:t>, Python looks at the first base class, then the second, then the third, etc. until it finds the function with the specified name or runs out of parent classes. </a:t>
-            </a:r>
-          </a:p>
         </p:txBody>
       </p:sp>
       <p:pic>
@@ -9870,7 +10425,7 @@
           <p:nvPr/>
         </p:nvPicPr>
         <p:blipFill>
-          <a:blip r:embed="rId2">
+          <a:blip r:embed="rId3">
             <a:extLst>
               <a:ext uri="{28A0092B-C50C-407E-A947-70E740481C1C}">
                 <a14:useLocalDpi xmlns:a14="http://schemas.microsoft.com/office/drawing/2010/main" val="0"/>
@@ -9883,8 +10438,8 @@
         </p:blipFill>
         <p:spPr>
           <a:xfrm>
-            <a:off x="5165124" y="2170941"/>
-            <a:ext cx="6678484" cy="4501708"/>
+            <a:off x="5001060" y="2183714"/>
+            <a:ext cx="7026869" cy="4167660"/>
           </a:xfrm>
           <a:prstGeom prst="rect">
             <a:avLst/>
@@ -9894,7 +10449,7 @@
     </p:spTree>
     <p:extLst>
       <p:ext uri="{BB962C8B-B14F-4D97-AF65-F5344CB8AC3E}">
-        <p14:creationId xmlns:p14="http://schemas.microsoft.com/office/powerpoint/2010/main" val="62369862"/>
+        <p14:creationId xmlns:p14="http://schemas.microsoft.com/office/powerpoint/2010/main" val="153380600"/>
       </p:ext>
     </p:extLst>
   </p:cSld>
@@ -9938,14 +10493,50 @@
           <a:p>
             <a:r>
               <a:rPr lang="en-US" dirty="0"/>
-              <a:t>The Method Resolution Order</a:t>
-            </a:r>
-          </a:p>
-        </p:txBody>
-      </p:sp>
-      <p:sp>
-        <p:nvSpPr>
-          <p:cNvPr id="3" name="Content Placeholder 2"/>
+              <a:t>Example: A Piece-Wise Function </a:t>
+            </a:r>
+          </a:p>
+        </p:txBody>
+      </p:sp>
+      <p:pic>
+        <p:nvPicPr>
+          <p:cNvPr id="5" name="Picture 4"/>
+          <p:cNvPicPr>
+            <a:picLocks noChangeAspect="1"/>
+          </p:cNvPicPr>
+          <p:nvPr/>
+        </p:nvPicPr>
+        <p:blipFill>
+          <a:blip r:embed="rId3">
+            <a:extLst>
+              <a:ext uri="{28A0092B-C50C-407E-A947-70E740481C1C}">
+                <a14:useLocalDpi xmlns:a14="http://schemas.microsoft.com/office/drawing/2010/main" val="0"/>
+              </a:ext>
+            </a:extLst>
+          </a:blip>
+          <a:stretch>
+            <a:fillRect/>
+          </a:stretch>
+        </p:blipFill>
+        <p:spPr>
+          <a:xfrm>
+            <a:off x="5008263" y="2148649"/>
+            <a:ext cx="6841867" cy="4438928"/>
+          </a:xfrm>
+          <a:prstGeom prst="rect">
+            <a:avLst/>
+          </a:prstGeom>
+        </p:spPr>
+      </p:pic>
+      <p:sp>
+        <p:nvSpPr>
+          <p:cNvPr id="7" name="Content Placeholder 2">
+            <a:extLst>
+              <a:ext uri="{FF2B5EF4-FFF2-40B4-BE49-F238E27FC236}">
+                <a16:creationId xmlns:a16="http://schemas.microsoft.com/office/drawing/2014/main" id="{E02DA4EA-BBB8-414F-9C47-D0412D9AF3AC}"/>
+              </a:ext>
+            </a:extLst>
+          </p:cNvPr>
           <p:cNvSpPr>
             <a:spLocks noGrp="1"/>
           </p:cNvSpPr>
@@ -9955,50 +10546,13 @@
         </p:nvSpPr>
         <p:spPr>
           <a:xfrm>
-            <a:off x="172995" y="2336873"/>
-            <a:ext cx="4868905" cy="4212208"/>
+            <a:off x="148280" y="2183714"/>
+            <a:ext cx="4744996" cy="4368799"/>
           </a:xfrm>
         </p:spPr>
         <p:txBody>
           <a:bodyPr/>
           <a:lstStyle/>
-          <a:p>
-            <a:pPr marL="0" lvl="0" indent="0">
-              <a:lnSpc>
-                <a:spcPct val="100000"/>
-              </a:lnSpc>
-              <a:spcBef>
-                <a:spcPts val="0"/>
-              </a:spcBef>
-              <a:buNone/>
-              <a:defRPr/>
-            </a:pPr>
-            <a:r>
-              <a:rPr lang="en-US" dirty="0"/>
-              <a:t>The MRO is the reason </a:t>
-            </a:r>
-            <a:r>
-              <a:rPr lang="en-US" i="1" dirty="0"/>
-              <a:t>super()</a:t>
-            </a:r>
-            <a:r>
-              <a:rPr lang="en-US" dirty="0"/>
-              <a:t> may not always do what you want when using multiple inheritance </a:t>
-            </a:r>
-          </a:p>
-          <a:p>
-            <a:pPr marL="0" lvl="0" indent="0">
-              <a:lnSpc>
-                <a:spcPct val="100000"/>
-              </a:lnSpc>
-              <a:spcBef>
-                <a:spcPts val="0"/>
-              </a:spcBef>
-              <a:buNone/>
-              <a:defRPr/>
-            </a:pPr>
-            <a:endParaRPr lang="en-US" dirty="0"/>
-          </a:p>
           <a:p>
             <a:pPr marL="0" marR="0" lvl="0" indent="0" defTabSz="914400" eaLnBrk="1" fontAlgn="auto" latinLnBrk="0" hangingPunct="1">
               <a:lnSpc>
@@ -10017,7 +10571,49 @@
               <a:tabLst/>
               <a:defRPr/>
             </a:pPr>
-            <a:endParaRPr lang="en-US" dirty="0"/>
+            <a:r>
+              <a:rPr lang="en-US" dirty="0"/>
+              <a:t>The two base classes </a:t>
+            </a:r>
+          </a:p>
+          <a:p>
+            <a:pPr lvl="1">
+              <a:lnSpc>
+                <a:spcPct val="100000"/>
+              </a:lnSpc>
+              <a:spcBef>
+                <a:spcPts val="0"/>
+              </a:spcBef>
+              <a:defRPr/>
+            </a:pPr>
+            <a:r>
+              <a:rPr lang="en-US" i="1" dirty="0"/>
+              <a:t>exponential</a:t>
+            </a:r>
+            <a:r>
+              <a:rPr lang="en-US" dirty="0"/>
+              <a:t> describes a classic e-folding function </a:t>
+            </a:r>
+          </a:p>
+          <a:p>
+            <a:pPr lvl="1">
+              <a:lnSpc>
+                <a:spcPct val="100000"/>
+              </a:lnSpc>
+              <a:spcBef>
+                <a:spcPts val="0"/>
+              </a:spcBef>
+              <a:defRPr/>
+            </a:pPr>
+            <a:r>
+              <a:rPr lang="en-US" i="1" dirty="0"/>
+              <a:t>sinusoid</a:t>
+            </a:r>
+            <a:r>
+              <a:rPr lang="en-US" dirty="0"/>
+              <a:t> describes a sine or cosine function</a:t>
+            </a:r>
+            <a:endParaRPr lang="en-US" i="1" dirty="0"/>
           </a:p>
           <a:p>
             <a:pPr marL="0" marR="0" lvl="0" indent="0" defTabSz="914400" eaLnBrk="1" fontAlgn="auto" latinLnBrk="0" hangingPunct="1">
@@ -10037,88 +10633,65 @@
               <a:tabLst/>
               <a:defRPr/>
             </a:pPr>
+            <a:endParaRPr lang="en-US" dirty="0"/>
+          </a:p>
+          <a:p>
+            <a:pPr marL="0" marR="0" lvl="0" indent="0" defTabSz="914400" eaLnBrk="1" fontAlgn="auto" latinLnBrk="0" hangingPunct="1">
+              <a:lnSpc>
+                <a:spcPct val="100000"/>
+              </a:lnSpc>
+              <a:spcBef>
+                <a:spcPts val="0"/>
+              </a:spcBef>
+              <a:spcAft>
+                <a:spcPts val="0"/>
+              </a:spcAft>
+              <a:buClrTx/>
+              <a:buSzTx/>
+              <a:buFontTx/>
+              <a:buNone/>
+              <a:tabLst/>
+              <a:defRPr/>
+            </a:pPr>
+            <a:endParaRPr lang="en-US" dirty="0"/>
+          </a:p>
+          <a:p>
+            <a:pPr marL="0" marR="0" lvl="0" indent="0" defTabSz="914400" eaLnBrk="1" fontAlgn="auto" latinLnBrk="0" hangingPunct="1">
+              <a:lnSpc>
+                <a:spcPct val="100000"/>
+              </a:lnSpc>
+              <a:spcBef>
+                <a:spcPts val="0"/>
+              </a:spcBef>
+              <a:spcAft>
+                <a:spcPts val="0"/>
+              </a:spcAft>
+              <a:buClrTx/>
+              <a:buSzTx/>
+              <a:buFontTx/>
+              <a:buNone/>
+              <a:tabLst/>
+              <a:defRPr/>
+            </a:pPr>
             <a:r>
               <a:rPr lang="en-US" dirty="0"/>
-              <a:t>By reversing the order of </a:t>
+              <a:t>Invoking the inherited class directly can also be used to write the </a:t>
             </a:r>
             <a:r>
               <a:rPr lang="en-US" i="1" dirty="0"/>
-              <a:t>exponential</a:t>
+              <a:t>__call__</a:t>
             </a:r>
             <a:r>
               <a:rPr lang="en-US" dirty="0"/>
-              <a:t> and </a:t>
-            </a:r>
-            <a:r>
-              <a:rPr lang="en-US" i="1" dirty="0"/>
-              <a:t>sinusoid</a:t>
-            </a:r>
-            <a:r>
-              <a:rPr lang="en-US" dirty="0"/>
-              <a:t> in the class declaration, the code would find </a:t>
-            </a:r>
-            <a:r>
-              <a:rPr lang="en-US" i="1" dirty="0" err="1"/>
-              <a:t>sinusoid.__call</a:t>
-            </a:r>
-            <a:r>
-              <a:rPr lang="en-US" i="1" dirty="0"/>
-              <a:t>__</a:t>
-            </a:r>
-            <a:r>
-              <a:rPr lang="en-US" dirty="0"/>
-              <a:t> instead of </a:t>
-            </a:r>
-            <a:r>
-              <a:rPr lang="en-US" i="1" dirty="0" err="1"/>
-              <a:t>exponential.__call</a:t>
-            </a:r>
-            <a:r>
-              <a:rPr lang="en-US" i="1" dirty="0"/>
-              <a:t>__</a:t>
-            </a:r>
-            <a:r>
-              <a:rPr lang="en-US" dirty="0"/>
-              <a:t>. </a:t>
-            </a:r>
-            <a:endParaRPr lang="en-US" i="1" dirty="0"/>
-          </a:p>
-        </p:txBody>
-      </p:sp>
-      <p:pic>
-        <p:nvPicPr>
-          <p:cNvPr id="4" name="Picture 3"/>
-          <p:cNvPicPr>
-            <a:picLocks noChangeAspect="1"/>
-          </p:cNvPicPr>
-          <p:nvPr/>
-        </p:nvPicPr>
-        <p:blipFill>
-          <a:blip r:embed="rId2">
-            <a:extLst>
-              <a:ext uri="{28A0092B-C50C-407E-A947-70E740481C1C}">
-                <a14:useLocalDpi xmlns:a14="http://schemas.microsoft.com/office/drawing/2010/main" val="0"/>
-              </a:ext>
-            </a:extLst>
-          </a:blip>
-          <a:stretch>
-            <a:fillRect/>
-          </a:stretch>
-        </p:blipFill>
-        <p:spPr>
-          <a:xfrm>
-            <a:off x="5165124" y="2170941"/>
-            <a:ext cx="6678484" cy="4501708"/>
-          </a:xfrm>
-          <a:prstGeom prst="rect">
-            <a:avLst/>
-          </a:prstGeom>
-        </p:spPr>
-      </p:pic>
+              <a:t> function (or any function for that matter) </a:t>
+            </a:r>
+          </a:p>
+        </p:txBody>
+      </p:sp>
     </p:spTree>
     <p:extLst>
       <p:ext uri="{BB962C8B-B14F-4D97-AF65-F5344CB8AC3E}">
-        <p14:creationId xmlns:p14="http://schemas.microsoft.com/office/powerpoint/2010/main" val="402757962"/>
+        <p14:creationId xmlns:p14="http://schemas.microsoft.com/office/powerpoint/2010/main" val="947720690"/>
       </p:ext>
     </p:extLst>
   </p:cSld>

</xml_diff>